<commit_message>
Adds carbamazepine to DDI network graphic
</commit_message>
<xml_diff>
--- a/Qualification/Input/Content/images/DDI_CYP3A4_Compound_Network.pptx
+++ b/Qualification/Input/Content/images/DDI_CYP3A4_Compound_Network.pptx
@@ -112,14 +112,6 @@
 </p:presentation>
 </file>
 
-<file path=ppt/revisionInfo.xml><?xml version="1.0" encoding="utf-8"?>
-<p1510:revInfo xmlns:a="http://schemas.openxmlformats.org/drawingml/2006/main" xmlns:r="http://schemas.openxmlformats.org/officeDocument/2006/relationships" xmlns:p1510="http://schemas.microsoft.com/office/powerpoint/2015/10/main">
-  <p1510:revLst>
-    <p1510:client id="{D2694C53-4FB6-42FD-B235-864257C79444}" v="654" dt="2020-12-07T18:49:34.992"/>
-  </p1510:revLst>
-</p1510:revInfo>
-</file>
-
 <file path=ppt/changesInfos/changesInfo1.xml><?xml version="1.0" encoding="utf-8"?>
 <pc:chgInfo xmlns:a="http://schemas.openxmlformats.org/drawingml/2006/main" xmlns:r="http://schemas.openxmlformats.org/officeDocument/2006/relationships" xmlns:ac="http://schemas.microsoft.com/office/drawing/2013/main/command" xmlns:pc="http://schemas.microsoft.com/office/powerpoint/2013/main/command">
   <pc:docChgLst>
@@ -1008,6 +1000,318 @@
         </pc:cxnChg>
         <pc:cxnChg chg="add mod">
           <ac:chgData name="Sebastian Frechen" userId="c721ceb4-2a39-46ae-985c-72edadf23741" providerId="ADAL" clId="{D2694C53-4FB6-42FD-B235-864257C79444}" dt="2020-12-07T15:00:26.212" v="723" actId="1076"/>
+          <ac:cxnSpMkLst>
+            <pc:docMk/>
+            <pc:sldMk cId="2088911489" sldId="257"/>
+            <ac:cxnSpMk id="152" creationId="{105CBEA4-7FE5-462C-B2BD-91B1EB886460}"/>
+          </ac:cxnSpMkLst>
+        </pc:cxnChg>
+      </pc:sldChg>
+    </pc:docChg>
+  </pc:docChgLst>
+  <pc:docChgLst>
+    <pc:chgData name="Andre Dallmann" userId="5c23077c-d33a-43b1-8da1-43baabc21ac0" providerId="ADAL" clId="{F3D43407-5AF1-4B23-851E-C4C61BBA631B}"/>
+    <pc:docChg chg="undo redo custSel modSld">
+      <pc:chgData name="Andre Dallmann" userId="5c23077c-d33a-43b1-8da1-43baabc21ac0" providerId="ADAL" clId="{F3D43407-5AF1-4B23-851E-C4C61BBA631B}" dt="2022-04-27T16:10:30.556" v="274" actId="688"/>
+      <pc:docMkLst>
+        <pc:docMk/>
+      </pc:docMkLst>
+      <pc:sldChg chg="addSp delSp modSp mod">
+        <pc:chgData name="Andre Dallmann" userId="5c23077c-d33a-43b1-8da1-43baabc21ac0" providerId="ADAL" clId="{F3D43407-5AF1-4B23-851E-C4C61BBA631B}" dt="2022-04-27T16:10:30.556" v="274" actId="688"/>
+        <pc:sldMkLst>
+          <pc:docMk/>
+          <pc:sldMk cId="2088911489" sldId="257"/>
+        </pc:sldMkLst>
+        <pc:spChg chg="add mod">
+          <ac:chgData name="Andre Dallmann" userId="5c23077c-d33a-43b1-8da1-43baabc21ac0" providerId="ADAL" clId="{F3D43407-5AF1-4B23-851E-C4C61BBA631B}" dt="2022-04-27T16:10:04.338" v="270" actId="1037"/>
+          <ac:spMkLst>
+            <pc:docMk/>
+            <pc:sldMk cId="2088911489" sldId="257"/>
+            <ac:spMk id="68" creationId="{50FF466E-8DF8-43C2-B89B-AF0A7B2601C5}"/>
+          </ac:spMkLst>
+        </pc:spChg>
+        <pc:spChg chg="mod">
+          <ac:chgData name="Andre Dallmann" userId="5c23077c-d33a-43b1-8da1-43baabc21ac0" providerId="ADAL" clId="{F3D43407-5AF1-4B23-851E-C4C61BBA631B}" dt="2022-04-27T06:50:43.495" v="62" actId="1037"/>
+          <ac:spMkLst>
+            <pc:docMk/>
+            <pc:sldMk cId="2088911489" sldId="257"/>
+            <ac:spMk id="82" creationId="{901ABB62-9433-4052-B7AC-CC55EEC6EB10}"/>
+          </ac:spMkLst>
+        </pc:spChg>
+        <pc:spChg chg="mod">
+          <ac:chgData name="Andre Dallmann" userId="5c23077c-d33a-43b1-8da1-43baabc21ac0" providerId="ADAL" clId="{F3D43407-5AF1-4B23-851E-C4C61BBA631B}" dt="2022-04-27T06:47:05.428" v="1" actId="1076"/>
+          <ac:spMkLst>
+            <pc:docMk/>
+            <pc:sldMk cId="2088911489" sldId="257"/>
+            <ac:spMk id="84" creationId="{FA41E090-4E80-490D-98A9-B7B4DECEC8C9}"/>
+          </ac:spMkLst>
+        </pc:spChg>
+        <pc:spChg chg="mod">
+          <ac:chgData name="Andre Dallmann" userId="5c23077c-d33a-43b1-8da1-43baabc21ac0" providerId="ADAL" clId="{F3D43407-5AF1-4B23-851E-C4C61BBA631B}" dt="2022-04-27T06:49:43.293" v="42" actId="1076"/>
+          <ac:spMkLst>
+            <pc:docMk/>
+            <pc:sldMk cId="2088911489" sldId="257"/>
+            <ac:spMk id="86" creationId="{34ABF6B2-B4C6-47A9-B6F6-F387B0BADB24}"/>
+          </ac:spMkLst>
+        </pc:spChg>
+        <pc:spChg chg="add del mod">
+          <ac:chgData name="Andre Dallmann" userId="5c23077c-d33a-43b1-8da1-43baabc21ac0" providerId="ADAL" clId="{F3D43407-5AF1-4B23-851E-C4C61BBA631B}" dt="2022-04-27T06:55:12.893" v="106" actId="21"/>
+          <ac:spMkLst>
+            <pc:docMk/>
+            <pc:sldMk cId="2088911489" sldId="257"/>
+            <ac:spMk id="116" creationId="{B1DB5D57-8E33-4369-AAF6-4D70DD2F44B5}"/>
+          </ac:spMkLst>
+        </pc:spChg>
+        <pc:spChg chg="add del mod">
+          <ac:chgData name="Andre Dallmann" userId="5c23077c-d33a-43b1-8da1-43baabc21ac0" providerId="ADAL" clId="{F3D43407-5AF1-4B23-851E-C4C61BBA631B}" dt="2022-04-27T06:59:17.061" v="189" actId="21"/>
+          <ac:spMkLst>
+            <pc:docMk/>
+            <pc:sldMk cId="2088911489" sldId="257"/>
+            <ac:spMk id="118" creationId="{CC0DD4CD-D6E3-44BC-9192-18D13158FBEC}"/>
+          </ac:spMkLst>
+        </pc:spChg>
+        <pc:spChg chg="add del mod">
+          <ac:chgData name="Andre Dallmann" userId="5c23077c-d33a-43b1-8da1-43baabc21ac0" providerId="ADAL" clId="{F3D43407-5AF1-4B23-851E-C4C61BBA631B}" dt="2022-04-27T06:59:28.361" v="194" actId="21"/>
+          <ac:spMkLst>
+            <pc:docMk/>
+            <pc:sldMk cId="2088911489" sldId="257"/>
+            <ac:spMk id="122" creationId="{2D979589-4447-452C-BCFA-F5B424442C72}"/>
+          </ac:spMkLst>
+        </pc:spChg>
+        <pc:spChg chg="add del mod">
+          <ac:chgData name="Andre Dallmann" userId="5c23077c-d33a-43b1-8da1-43baabc21ac0" providerId="ADAL" clId="{F3D43407-5AF1-4B23-851E-C4C61BBA631B}" dt="2022-04-27T16:09:24.822" v="251" actId="21"/>
+          <ac:spMkLst>
+            <pc:docMk/>
+            <pc:sldMk cId="2088911489" sldId="257"/>
+            <ac:spMk id="127" creationId="{A4A83894-5761-4455-A6DB-B80A374CA023}"/>
+          </ac:spMkLst>
+        </pc:spChg>
+        <pc:spChg chg="add mod">
+          <ac:chgData name="Andre Dallmann" userId="5c23077c-d33a-43b1-8da1-43baabc21ac0" providerId="ADAL" clId="{F3D43407-5AF1-4B23-851E-C4C61BBA631B}" dt="2022-04-27T06:59:31.562" v="200" actId="1035"/>
+          <ac:spMkLst>
+            <pc:docMk/>
+            <pc:sldMk cId="2088911489" sldId="257"/>
+            <ac:spMk id="128" creationId="{D75756B5-F1D7-4970-8235-9450C3BB75A8}"/>
+          </ac:spMkLst>
+        </pc:spChg>
+        <pc:spChg chg="add mod">
+          <ac:chgData name="Andre Dallmann" userId="5c23077c-d33a-43b1-8da1-43baabc21ac0" providerId="ADAL" clId="{F3D43407-5AF1-4B23-851E-C4C61BBA631B}" dt="2022-04-27T07:02:37.663" v="218" actId="1037"/>
+          <ac:spMkLst>
+            <pc:docMk/>
+            <pc:sldMk cId="2088911489" sldId="257"/>
+            <ac:spMk id="130" creationId="{C57BCDDB-579F-4F27-9C24-60F05BC17FB4}"/>
+          </ac:spMkLst>
+        </pc:spChg>
+        <pc:spChg chg="add mod">
+          <ac:chgData name="Andre Dallmann" userId="5c23077c-d33a-43b1-8da1-43baabc21ac0" providerId="ADAL" clId="{F3D43407-5AF1-4B23-851E-C4C61BBA631B}" dt="2022-04-27T07:02:58.827" v="226" actId="1037"/>
+          <ac:spMkLst>
+            <pc:docMk/>
+            <pc:sldMk cId="2088911489" sldId="257"/>
+            <ac:spMk id="131" creationId="{D7FAA8E7-A924-4F21-98D1-078B92D34E01}"/>
+          </ac:spMkLst>
+        </pc:spChg>
+        <pc:spChg chg="add mod">
+          <ac:chgData name="Andre Dallmann" userId="5c23077c-d33a-43b1-8da1-43baabc21ac0" providerId="ADAL" clId="{F3D43407-5AF1-4B23-851E-C4C61BBA631B}" dt="2022-04-27T16:10:30.556" v="274" actId="688"/>
+          <ac:spMkLst>
+            <pc:docMk/>
+            <pc:sldMk cId="2088911489" sldId="257"/>
+            <ac:spMk id="135" creationId="{B4A4A427-3DC5-489E-BAF2-660A57CC0AAA}"/>
+          </ac:spMkLst>
+        </pc:spChg>
+        <pc:spChg chg="add del mod">
+          <ac:chgData name="Andre Dallmann" userId="5c23077c-d33a-43b1-8da1-43baabc21ac0" providerId="ADAL" clId="{F3D43407-5AF1-4B23-851E-C4C61BBA631B}" dt="2022-04-27T16:09:45.155" v="258" actId="21"/>
+          <ac:spMkLst>
+            <pc:docMk/>
+            <pc:sldMk cId="2088911489" sldId="257"/>
+            <ac:spMk id="138" creationId="{6AB0F6A8-6575-41F5-9ACE-F989864AF317}"/>
+          </ac:spMkLst>
+        </pc:spChg>
+        <pc:spChg chg="add mod">
+          <ac:chgData name="Andre Dallmann" userId="5c23077c-d33a-43b1-8da1-43baabc21ac0" providerId="ADAL" clId="{F3D43407-5AF1-4B23-851E-C4C61BBA631B}" dt="2022-04-27T16:09:45.772" v="259"/>
+          <ac:spMkLst>
+            <pc:docMk/>
+            <pc:sldMk cId="2088911489" sldId="257"/>
+            <ac:spMk id="142" creationId="{29E4E807-5A55-4E70-BF21-80D6599CBFF5}"/>
+          </ac:spMkLst>
+        </pc:spChg>
+        <pc:spChg chg="mod ord">
+          <ac:chgData name="Andre Dallmann" userId="5c23077c-d33a-43b1-8da1-43baabc21ac0" providerId="ADAL" clId="{F3D43407-5AF1-4B23-851E-C4C61BBA631B}" dt="2022-04-27T06:57:06.894" v="143" actId="1035"/>
+          <ac:spMkLst>
+            <pc:docMk/>
+            <pc:sldMk cId="2088911489" sldId="257"/>
+            <ac:spMk id="244" creationId="{F387589C-E349-4DAC-8146-D780AB632BC4}"/>
+          </ac:spMkLst>
+        </pc:spChg>
+        <pc:spChg chg="del mod">
+          <ac:chgData name="Andre Dallmann" userId="5c23077c-d33a-43b1-8da1-43baabc21ac0" providerId="ADAL" clId="{F3D43407-5AF1-4B23-851E-C4C61BBA631B}" dt="2022-04-27T07:02:33.377" v="212" actId="21"/>
+          <ac:spMkLst>
+            <pc:docMk/>
+            <pc:sldMk cId="2088911489" sldId="257"/>
+            <ac:spMk id="253" creationId="{DEAC0FB0-2A94-4D67-88DF-E76E683F63A8}"/>
+          </ac:spMkLst>
+        </pc:spChg>
+        <pc:spChg chg="del ord">
+          <ac:chgData name="Andre Dallmann" userId="5c23077c-d33a-43b1-8da1-43baabc21ac0" providerId="ADAL" clId="{F3D43407-5AF1-4B23-851E-C4C61BBA631B}" dt="2022-04-27T07:02:48.110" v="219" actId="21"/>
+          <ac:spMkLst>
+            <pc:docMk/>
+            <pc:sldMk cId="2088911489" sldId="257"/>
+            <ac:spMk id="277" creationId="{86EEBB6A-E241-42CE-AC13-98EBAF3ABA44}"/>
+          </ac:spMkLst>
+        </pc:spChg>
+        <pc:spChg chg="mod">
+          <ac:chgData name="Andre Dallmann" userId="5c23077c-d33a-43b1-8da1-43baabc21ac0" providerId="ADAL" clId="{F3D43407-5AF1-4B23-851E-C4C61BBA631B}" dt="2022-04-27T06:52:44.776" v="90" actId="1076"/>
+          <ac:spMkLst>
+            <pc:docMk/>
+            <pc:sldMk cId="2088911489" sldId="257"/>
+            <ac:spMk id="325" creationId="{33EB7A10-6F89-45BA-84DD-AEE2271C4041}"/>
+          </ac:spMkLst>
+        </pc:spChg>
+        <pc:cxnChg chg="mod">
+          <ac:chgData name="Andre Dallmann" userId="5c23077c-d33a-43b1-8da1-43baabc21ac0" providerId="ADAL" clId="{F3D43407-5AF1-4B23-851E-C4C61BBA631B}" dt="2022-04-27T06:47:05.428" v="1" actId="1076"/>
+          <ac:cxnSpMkLst>
+            <pc:docMk/>
+            <pc:sldMk cId="2088911489" sldId="257"/>
+            <ac:cxnSpMk id="5" creationId="{98537504-27D0-4241-8A5A-7E0EEFAD60AD}"/>
+          </ac:cxnSpMkLst>
+        </pc:cxnChg>
+        <pc:cxnChg chg="mod">
+          <ac:chgData name="Andre Dallmann" userId="5c23077c-d33a-43b1-8da1-43baabc21ac0" providerId="ADAL" clId="{F3D43407-5AF1-4B23-851E-C4C61BBA631B}" dt="2022-04-27T06:47:05.428" v="1" actId="1076"/>
+          <ac:cxnSpMkLst>
+            <pc:docMk/>
+            <pc:sldMk cId="2088911489" sldId="257"/>
+            <ac:cxnSpMk id="7" creationId="{0C052BFB-242C-44B2-8CD0-E6089625C38D}"/>
+          </ac:cxnSpMkLst>
+        </pc:cxnChg>
+        <pc:cxnChg chg="mod">
+          <ac:chgData name="Andre Dallmann" userId="5c23077c-d33a-43b1-8da1-43baabc21ac0" providerId="ADAL" clId="{F3D43407-5AF1-4B23-851E-C4C61BBA631B}" dt="2022-04-27T06:47:05.428" v="1" actId="1076"/>
+          <ac:cxnSpMkLst>
+            <pc:docMk/>
+            <pc:sldMk cId="2088911489" sldId="257"/>
+            <ac:cxnSpMk id="77" creationId="{A5A5293F-332F-431E-911C-C4115EFCBD06}"/>
+          </ac:cxnSpMkLst>
+        </pc:cxnChg>
+        <pc:cxnChg chg="add mod">
+          <ac:chgData name="Andre Dallmann" userId="5c23077c-d33a-43b1-8da1-43baabc21ac0" providerId="ADAL" clId="{F3D43407-5AF1-4B23-851E-C4C61BBA631B}" dt="2022-04-27T06:57:06.894" v="143" actId="1035"/>
+          <ac:cxnSpMkLst>
+            <pc:docMk/>
+            <pc:sldMk cId="2088911489" sldId="257"/>
+            <ac:cxnSpMk id="92" creationId="{84ED9C60-9627-4B93-92C1-7FDF9D8F45CA}"/>
+          </ac:cxnSpMkLst>
+        </pc:cxnChg>
+        <pc:cxnChg chg="add mod">
+          <ac:chgData name="Andre Dallmann" userId="5c23077c-d33a-43b1-8da1-43baabc21ac0" providerId="ADAL" clId="{F3D43407-5AF1-4B23-851E-C4C61BBA631B}" dt="2022-04-27T07:02:48.110" v="219" actId="21"/>
+          <ac:cxnSpMkLst>
+            <pc:docMk/>
+            <pc:sldMk cId="2088911489" sldId="257"/>
+            <ac:cxnSpMk id="93" creationId="{07AEED44-F50E-43CD-A8EB-B2D4494ACE1C}"/>
+          </ac:cxnSpMkLst>
+        </pc:cxnChg>
+        <pc:cxnChg chg="mod">
+          <ac:chgData name="Andre Dallmann" userId="5c23077c-d33a-43b1-8da1-43baabc21ac0" providerId="ADAL" clId="{F3D43407-5AF1-4B23-851E-C4C61BBA631B}" dt="2022-04-27T06:47:05.428" v="1" actId="1076"/>
+          <ac:cxnSpMkLst>
+            <pc:docMk/>
+            <pc:sldMk cId="2088911489" sldId="257"/>
+            <ac:cxnSpMk id="100" creationId="{D7399CD2-D18A-47C1-BDC8-C6388768C9A7}"/>
+          </ac:cxnSpMkLst>
+        </pc:cxnChg>
+        <pc:cxnChg chg="mod">
+          <ac:chgData name="Andre Dallmann" userId="5c23077c-d33a-43b1-8da1-43baabc21ac0" providerId="ADAL" clId="{F3D43407-5AF1-4B23-851E-C4C61BBA631B}" dt="2022-04-27T06:47:05.428" v="1" actId="1076"/>
+          <ac:cxnSpMkLst>
+            <pc:docMk/>
+            <pc:sldMk cId="2088911489" sldId="257"/>
+            <ac:cxnSpMk id="102" creationId="{91971EEA-8B65-4C45-B9D5-ACE1E23E19CE}"/>
+          </ac:cxnSpMkLst>
+        </pc:cxnChg>
+        <pc:cxnChg chg="mod">
+          <ac:chgData name="Andre Dallmann" userId="5c23077c-d33a-43b1-8da1-43baabc21ac0" providerId="ADAL" clId="{F3D43407-5AF1-4B23-851E-C4C61BBA631B}" dt="2022-04-27T06:50:06.925" v="46" actId="14100"/>
+          <ac:cxnSpMkLst>
+            <pc:docMk/>
+            <pc:sldMk cId="2088911489" sldId="257"/>
+            <ac:cxnSpMk id="106" creationId="{CB17A08C-A6C5-4551-A895-034B94DF707F}"/>
+          </ac:cxnSpMkLst>
+        </pc:cxnChg>
+        <pc:cxnChg chg="add del mod ord">
+          <ac:chgData name="Andre Dallmann" userId="5c23077c-d33a-43b1-8da1-43baabc21ac0" providerId="ADAL" clId="{F3D43407-5AF1-4B23-851E-C4C61BBA631B}" dt="2022-04-27T16:09:34.755" v="254" actId="21"/>
+          <ac:cxnSpMkLst>
+            <pc:docMk/>
+            <pc:sldMk cId="2088911489" sldId="257"/>
+            <ac:cxnSpMk id="107" creationId="{98AA24B8-905D-459D-9E48-7E52A0F110C3}"/>
+          </ac:cxnSpMkLst>
+        </pc:cxnChg>
+        <pc:cxnChg chg="mod ord">
+          <ac:chgData name="Andre Dallmann" userId="5c23077c-d33a-43b1-8da1-43baabc21ac0" providerId="ADAL" clId="{F3D43407-5AF1-4B23-851E-C4C61BBA631B}" dt="2022-04-27T06:57:06.894" v="143" actId="1035"/>
+          <ac:cxnSpMkLst>
+            <pc:docMk/>
+            <pc:sldMk cId="2088911489" sldId="257"/>
+            <ac:cxnSpMk id="108" creationId="{89AC0BCD-9B85-417C-86DD-31F6D26CD7CA}"/>
+          </ac:cxnSpMkLst>
+        </pc:cxnChg>
+        <pc:cxnChg chg="add mod ord">
+          <ac:chgData name="Andre Dallmann" userId="5c23077c-d33a-43b1-8da1-43baabc21ac0" providerId="ADAL" clId="{F3D43407-5AF1-4B23-851E-C4C61BBA631B}" dt="2022-04-27T07:02:27.877" v="211" actId="166"/>
+          <ac:cxnSpMkLst>
+            <pc:docMk/>
+            <pc:sldMk cId="2088911489" sldId="257"/>
+            <ac:cxnSpMk id="119" creationId="{7D07BA42-CA0B-4872-A6F5-88E18BF45201}"/>
+          </ac:cxnSpMkLst>
+        </pc:cxnChg>
+        <pc:cxnChg chg="add mod">
+          <ac:chgData name="Andre Dallmann" userId="5c23077c-d33a-43b1-8da1-43baabc21ac0" providerId="ADAL" clId="{F3D43407-5AF1-4B23-851E-C4C61BBA631B}" dt="2022-04-27T16:08:30.888" v="229" actId="14100"/>
+          <ac:cxnSpMkLst>
+            <pc:docMk/>
+            <pc:sldMk cId="2088911489" sldId="257"/>
+            <ac:cxnSpMk id="132" creationId="{7854DC59-44F2-4CC9-9B92-B9A2DF0A9599}"/>
+          </ac:cxnSpMkLst>
+        </pc:cxnChg>
+        <pc:cxnChg chg="mod">
+          <ac:chgData name="Andre Dallmann" userId="5c23077c-d33a-43b1-8da1-43baabc21ac0" providerId="ADAL" clId="{F3D43407-5AF1-4B23-851E-C4C61BBA631B}" dt="2022-04-27T06:50:43.495" v="62" actId="1037"/>
+          <ac:cxnSpMkLst>
+            <pc:docMk/>
+            <pc:sldMk cId="2088911489" sldId="257"/>
+            <ac:cxnSpMk id="133" creationId="{D3F66049-C9FD-4768-9ED6-300B21567E45}"/>
+          </ac:cxnSpMkLst>
+        </pc:cxnChg>
+        <pc:cxnChg chg="mod ord">
+          <ac:chgData name="Andre Dallmann" userId="5c23077c-d33a-43b1-8da1-43baabc21ac0" providerId="ADAL" clId="{F3D43407-5AF1-4B23-851E-C4C61BBA631B}" dt="2022-04-27T07:02:48.110" v="219" actId="21"/>
+          <ac:cxnSpMkLst>
+            <pc:docMk/>
+            <pc:sldMk cId="2088911489" sldId="257"/>
+            <ac:cxnSpMk id="140" creationId="{8A96EBF3-887E-4E23-BC0F-246AEE2D44B3}"/>
+          </ac:cxnSpMkLst>
+        </pc:cxnChg>
+        <pc:cxnChg chg="add del mod">
+          <ac:chgData name="Andre Dallmann" userId="5c23077c-d33a-43b1-8da1-43baabc21ac0" providerId="ADAL" clId="{F3D43407-5AF1-4B23-851E-C4C61BBA631B}" dt="2022-04-27T16:09:41.205" v="257"/>
+          <ac:cxnSpMkLst>
+            <pc:docMk/>
+            <pc:sldMk cId="2088911489" sldId="257"/>
+            <ac:cxnSpMk id="141" creationId="{D756DE5F-91B3-4242-AC21-1F6296FE0CE4}"/>
+          </ac:cxnSpMkLst>
+        </pc:cxnChg>
+        <pc:cxnChg chg="mod">
+          <ac:chgData name="Andre Dallmann" userId="5c23077c-d33a-43b1-8da1-43baabc21ac0" providerId="ADAL" clId="{F3D43407-5AF1-4B23-851E-C4C61BBA631B}" dt="2022-04-27T06:57:06.894" v="143" actId="1035"/>
+          <ac:cxnSpMkLst>
+            <pc:docMk/>
+            <pc:sldMk cId="2088911489" sldId="257"/>
+            <ac:cxnSpMk id="143" creationId="{BA060CCB-E7DC-4D18-9D56-E48AC35FC14C}"/>
+          </ac:cxnSpMkLst>
+        </pc:cxnChg>
+        <pc:cxnChg chg="add mod">
+          <ac:chgData name="Andre Dallmann" userId="5c23077c-d33a-43b1-8da1-43baabc21ac0" providerId="ADAL" clId="{F3D43407-5AF1-4B23-851E-C4C61BBA631B}" dt="2022-04-27T16:10:30.556" v="274" actId="688"/>
+          <ac:cxnSpMkLst>
+            <pc:docMk/>
+            <pc:sldMk cId="2088911489" sldId="257"/>
+            <ac:cxnSpMk id="144" creationId="{029B5047-0E4B-4552-A84F-C40E2AE27D02}"/>
+          </ac:cxnSpMkLst>
+        </pc:cxnChg>
+        <pc:cxnChg chg="mod">
+          <ac:chgData name="Andre Dallmann" userId="5c23077c-d33a-43b1-8da1-43baabc21ac0" providerId="ADAL" clId="{F3D43407-5AF1-4B23-851E-C4C61BBA631B}" dt="2022-04-27T07:02:33.377" v="212" actId="21"/>
+          <ac:cxnSpMkLst>
+            <pc:docMk/>
+            <pc:sldMk cId="2088911489" sldId="257"/>
+            <ac:cxnSpMk id="146" creationId="{C6ABEC47-3159-4869-A8A9-3CA11764A86F}"/>
+          </ac:cxnSpMkLst>
+        </pc:cxnChg>
+        <pc:cxnChg chg="mod">
+          <ac:chgData name="Andre Dallmann" userId="5c23077c-d33a-43b1-8da1-43baabc21ac0" providerId="ADAL" clId="{F3D43407-5AF1-4B23-851E-C4C61BBA631B}" dt="2022-04-27T06:50:43.495" v="62" actId="1037"/>
           <ac:cxnSpMkLst>
             <pc:docMk/>
             <pc:sldMk cId="2088911489" sldId="257"/>
@@ -1151,7 +1455,7 @@
           <a:p>
             <a:fld id="{3A25AF7A-D1F1-44F6-9E50-C79D58050BA4}" type="datetimeFigureOut">
               <a:rPr lang="en-US" smtClean="0"/>
-              <a:t>1/13/2022</a:t>
+              <a:t>4/27/2022</a:t>
             </a:fld>
             <a:endParaRPr lang="en-US" dirty="0"/>
           </a:p>
@@ -1193,7 +1497,7 @@
           <a:p>
             <a:fld id="{84E92838-740C-420B-9518-DF4A7DEF82EA}" type="slidenum">
               <a:rPr lang="en-US" smtClean="0"/>
-              <a:t>‹Nr.›</a:t>
+              <a:t>‹#›</a:t>
             </a:fld>
             <a:endParaRPr lang="en-US" dirty="0"/>
           </a:p>
@@ -1321,7 +1625,7 @@
           <a:p>
             <a:fld id="{3A25AF7A-D1F1-44F6-9E50-C79D58050BA4}" type="datetimeFigureOut">
               <a:rPr lang="en-US" smtClean="0"/>
-              <a:t>1/13/2022</a:t>
+              <a:t>4/27/2022</a:t>
             </a:fld>
             <a:endParaRPr lang="en-US" dirty="0"/>
           </a:p>
@@ -1363,7 +1667,7 @@
           <a:p>
             <a:fld id="{84E92838-740C-420B-9518-DF4A7DEF82EA}" type="slidenum">
               <a:rPr lang="en-US" smtClean="0"/>
-              <a:t>‹Nr.›</a:t>
+              <a:t>‹#›</a:t>
             </a:fld>
             <a:endParaRPr lang="en-US" dirty="0"/>
           </a:p>
@@ -1501,7 +1805,7 @@
           <a:p>
             <a:fld id="{3A25AF7A-D1F1-44F6-9E50-C79D58050BA4}" type="datetimeFigureOut">
               <a:rPr lang="en-US" smtClean="0"/>
-              <a:t>1/13/2022</a:t>
+              <a:t>4/27/2022</a:t>
             </a:fld>
             <a:endParaRPr lang="en-US" dirty="0"/>
           </a:p>
@@ -1543,7 +1847,7 @@
           <a:p>
             <a:fld id="{84E92838-740C-420B-9518-DF4A7DEF82EA}" type="slidenum">
               <a:rPr lang="en-US" smtClean="0"/>
-              <a:t>‹Nr.›</a:t>
+              <a:t>‹#›</a:t>
             </a:fld>
             <a:endParaRPr lang="en-US" dirty="0"/>
           </a:p>
@@ -1671,7 +1975,7 @@
           <a:p>
             <a:fld id="{3A25AF7A-D1F1-44F6-9E50-C79D58050BA4}" type="datetimeFigureOut">
               <a:rPr lang="en-US" smtClean="0"/>
-              <a:t>1/13/2022</a:t>
+              <a:t>4/27/2022</a:t>
             </a:fld>
             <a:endParaRPr lang="en-US" dirty="0"/>
           </a:p>
@@ -1713,7 +2017,7 @@
           <a:p>
             <a:fld id="{84E92838-740C-420B-9518-DF4A7DEF82EA}" type="slidenum">
               <a:rPr lang="en-US" smtClean="0"/>
-              <a:t>‹Nr.›</a:t>
+              <a:t>‹#›</a:t>
             </a:fld>
             <a:endParaRPr lang="en-US" dirty="0"/>
           </a:p>
@@ -1917,7 +2221,7 @@
           <a:p>
             <a:fld id="{3A25AF7A-D1F1-44F6-9E50-C79D58050BA4}" type="datetimeFigureOut">
               <a:rPr lang="en-US" smtClean="0"/>
-              <a:t>1/13/2022</a:t>
+              <a:t>4/27/2022</a:t>
             </a:fld>
             <a:endParaRPr lang="en-US" dirty="0"/>
           </a:p>
@@ -1959,7 +2263,7 @@
           <a:p>
             <a:fld id="{84E92838-740C-420B-9518-DF4A7DEF82EA}" type="slidenum">
               <a:rPr lang="en-US" smtClean="0"/>
-              <a:t>‹Nr.›</a:t>
+              <a:t>‹#›</a:t>
             </a:fld>
             <a:endParaRPr lang="en-US" dirty="0"/>
           </a:p>
@@ -2149,7 +2453,7 @@
           <a:p>
             <a:fld id="{3A25AF7A-D1F1-44F6-9E50-C79D58050BA4}" type="datetimeFigureOut">
               <a:rPr lang="en-US" smtClean="0"/>
-              <a:t>1/13/2022</a:t>
+              <a:t>4/27/2022</a:t>
             </a:fld>
             <a:endParaRPr lang="en-US" dirty="0"/>
           </a:p>
@@ -2191,7 +2495,7 @@
           <a:p>
             <a:fld id="{84E92838-740C-420B-9518-DF4A7DEF82EA}" type="slidenum">
               <a:rPr lang="en-US" smtClean="0"/>
-              <a:t>‹Nr.›</a:t>
+              <a:t>‹#›</a:t>
             </a:fld>
             <a:endParaRPr lang="en-US" dirty="0"/>
           </a:p>
@@ -2516,7 +2820,7 @@
           <a:p>
             <a:fld id="{3A25AF7A-D1F1-44F6-9E50-C79D58050BA4}" type="datetimeFigureOut">
               <a:rPr lang="en-US" smtClean="0"/>
-              <a:t>1/13/2022</a:t>
+              <a:t>4/27/2022</a:t>
             </a:fld>
             <a:endParaRPr lang="en-US" dirty="0"/>
           </a:p>
@@ -2558,7 +2862,7 @@
           <a:p>
             <a:fld id="{84E92838-740C-420B-9518-DF4A7DEF82EA}" type="slidenum">
               <a:rPr lang="en-US" smtClean="0"/>
-              <a:t>‹Nr.›</a:t>
+              <a:t>‹#›</a:t>
             </a:fld>
             <a:endParaRPr lang="en-US" dirty="0"/>
           </a:p>
@@ -2634,7 +2938,7 @@
           <a:p>
             <a:fld id="{3A25AF7A-D1F1-44F6-9E50-C79D58050BA4}" type="datetimeFigureOut">
               <a:rPr lang="en-US" smtClean="0"/>
-              <a:t>1/13/2022</a:t>
+              <a:t>4/27/2022</a:t>
             </a:fld>
             <a:endParaRPr lang="en-US" dirty="0"/>
           </a:p>
@@ -2676,7 +2980,7 @@
           <a:p>
             <a:fld id="{84E92838-740C-420B-9518-DF4A7DEF82EA}" type="slidenum">
               <a:rPr lang="en-US" smtClean="0"/>
-              <a:t>‹Nr.›</a:t>
+              <a:t>‹#›</a:t>
             </a:fld>
             <a:endParaRPr lang="en-US" dirty="0"/>
           </a:p>
@@ -2729,7 +3033,7 @@
           <a:p>
             <a:fld id="{3A25AF7A-D1F1-44F6-9E50-C79D58050BA4}" type="datetimeFigureOut">
               <a:rPr lang="en-US" smtClean="0"/>
-              <a:t>1/13/2022</a:t>
+              <a:t>4/27/2022</a:t>
             </a:fld>
             <a:endParaRPr lang="en-US" dirty="0"/>
           </a:p>
@@ -2771,7 +3075,7 @@
           <a:p>
             <a:fld id="{84E92838-740C-420B-9518-DF4A7DEF82EA}" type="slidenum">
               <a:rPr lang="en-US" smtClean="0"/>
-              <a:t>‹Nr.›</a:t>
+              <a:t>‹#›</a:t>
             </a:fld>
             <a:endParaRPr lang="en-US" dirty="0"/>
           </a:p>
@@ -3006,7 +3310,7 @@
           <a:p>
             <a:fld id="{3A25AF7A-D1F1-44F6-9E50-C79D58050BA4}" type="datetimeFigureOut">
               <a:rPr lang="en-US" smtClean="0"/>
-              <a:t>1/13/2022</a:t>
+              <a:t>4/27/2022</a:t>
             </a:fld>
             <a:endParaRPr lang="en-US" dirty="0"/>
           </a:p>
@@ -3048,7 +3352,7 @@
           <a:p>
             <a:fld id="{84E92838-740C-420B-9518-DF4A7DEF82EA}" type="slidenum">
               <a:rPr lang="en-US" smtClean="0"/>
-              <a:t>‹Nr.›</a:t>
+              <a:t>‹#›</a:t>
             </a:fld>
             <a:endParaRPr lang="en-US" dirty="0"/>
           </a:p>
@@ -3263,7 +3567,7 @@
           <a:p>
             <a:fld id="{3A25AF7A-D1F1-44F6-9E50-C79D58050BA4}" type="datetimeFigureOut">
               <a:rPr lang="en-US" smtClean="0"/>
-              <a:t>1/13/2022</a:t>
+              <a:t>4/27/2022</a:t>
             </a:fld>
             <a:endParaRPr lang="en-US" dirty="0"/>
           </a:p>
@@ -3305,7 +3609,7 @@
           <a:p>
             <a:fld id="{84E92838-740C-420B-9518-DF4A7DEF82EA}" type="slidenum">
               <a:rPr lang="en-US" smtClean="0"/>
-              <a:t>‹Nr.›</a:t>
+              <a:t>‹#›</a:t>
             </a:fld>
             <a:endParaRPr lang="en-US" dirty="0"/>
           </a:p>
@@ -3476,7 +3780,7 @@
           <a:p>
             <a:fld id="{3A25AF7A-D1F1-44F6-9E50-C79D58050BA4}" type="datetimeFigureOut">
               <a:rPr lang="en-US" smtClean="0"/>
-              <a:t>1/13/2022</a:t>
+              <a:t>4/27/2022</a:t>
             </a:fld>
             <a:endParaRPr lang="en-US" dirty="0"/>
           </a:p>
@@ -3554,7 +3858,7 @@
           <a:p>
             <a:fld id="{84E92838-740C-420B-9518-DF4A7DEF82EA}" type="slidenum">
               <a:rPr lang="en-US" smtClean="0"/>
-              <a:t>‹Nr.›</a:t>
+              <a:t>‹#›</a:t>
             </a:fld>
             <a:endParaRPr lang="en-US" dirty="0"/>
           </a:p>
@@ -3985,10 +4289,10 @@
         </p:nvGrpSpPr>
         <p:grpSpPr>
           <a:xfrm>
-            <a:off x="1008548" y="242884"/>
-            <a:ext cx="8925296" cy="4438275"/>
-            <a:chOff x="1008548" y="78769"/>
-            <a:chExt cx="8925296" cy="4438275"/>
+            <a:off x="945048" y="242884"/>
+            <a:ext cx="8988796" cy="4438275"/>
+            <a:chOff x="945048" y="78769"/>
+            <a:chExt cx="8988796" cy="4438275"/>
           </a:xfrm>
         </p:grpSpPr>
         <p:sp>
@@ -4467,7 +4771,7 @@
           </p:nvSpPr>
           <p:spPr>
             <a:xfrm>
-              <a:off x="1008548" y="2202652"/>
+              <a:off x="945048" y="2202652"/>
               <a:ext cx="1184475" cy="292388"/>
             </a:xfrm>
             <a:prstGeom prst="rect">
@@ -4544,7 +4848,7 @@
           </p:nvSpPr>
           <p:spPr>
             <a:xfrm>
-              <a:off x="2277194" y="655921"/>
+              <a:off x="2275413" y="547308"/>
               <a:ext cx="1210628" cy="292388"/>
             </a:xfrm>
             <a:prstGeom prst="rect">
@@ -4629,7 +4933,7 @@
           </p:nvSpPr>
           <p:spPr>
             <a:xfrm>
-              <a:off x="1659106" y="1323557"/>
+              <a:off x="1648174" y="1036679"/>
               <a:ext cx="1019630" cy="292388"/>
             </a:xfrm>
             <a:prstGeom prst="rect">
@@ -5120,8 +5424,8 @@
         </p:nvCxnSpPr>
         <p:spPr>
           <a:xfrm flipH="1">
-            <a:off x="2836961" y="1112424"/>
-            <a:ext cx="45547" cy="2516615"/>
+            <a:off x="2836961" y="1003811"/>
+            <a:ext cx="43766" cy="2625228"/>
           </a:xfrm>
           <a:prstGeom prst="straightConnector1">
             <a:avLst/>
@@ -5163,8 +5467,8 @@
         </p:nvCxnSpPr>
         <p:spPr>
           <a:xfrm>
-            <a:off x="2882508" y="1112424"/>
-            <a:ext cx="1586124" cy="2970496"/>
+            <a:off x="2880727" y="1003811"/>
+            <a:ext cx="1587905" cy="3079109"/>
           </a:xfrm>
           <a:prstGeom prst="straightConnector1">
             <a:avLst/>
@@ -5206,8 +5510,8 @@
         </p:nvCxnSpPr>
         <p:spPr>
           <a:xfrm>
-            <a:off x="2882508" y="1112424"/>
-            <a:ext cx="3727456" cy="3227082"/>
+            <a:off x="2880727" y="1003811"/>
+            <a:ext cx="3729237" cy="3335695"/>
           </a:xfrm>
           <a:prstGeom prst="straightConnector1">
             <a:avLst/>
@@ -5249,8 +5553,8 @@
         </p:nvCxnSpPr>
         <p:spPr>
           <a:xfrm flipV="1">
-            <a:off x="3487822" y="704794"/>
-            <a:ext cx="3110736" cy="261436"/>
+            <a:off x="3486041" y="704794"/>
+            <a:ext cx="3112517" cy="152823"/>
           </a:xfrm>
           <a:prstGeom prst="straightConnector1">
             <a:avLst/>
@@ -5292,8 +5596,8 @@
         </p:nvCxnSpPr>
         <p:spPr>
           <a:xfrm>
-            <a:off x="2882508" y="1112424"/>
-            <a:ext cx="5260459" cy="2662069"/>
+            <a:off x="2880727" y="1003811"/>
+            <a:ext cx="5262240" cy="2770682"/>
           </a:xfrm>
           <a:prstGeom prst="straightConnector1">
             <a:avLst/>
@@ -5414,58 +5718,14 @@
           </p:cNvPr>
           <p:cNvCxnSpPr>
             <a:cxnSpLocks/>
-            <a:stCxn id="86" idx="2"/>
             <a:endCxn id="308" idx="3"/>
           </p:cNvCxnSpPr>
           <p:nvPr/>
         </p:nvCxnSpPr>
         <p:spPr>
           <a:xfrm>
-            <a:off x="2168921" y="1780060"/>
-            <a:ext cx="5795780" cy="2083858"/>
-          </a:xfrm>
-          <a:prstGeom prst="straightConnector1">
-            <a:avLst/>
-          </a:prstGeom>
-          <a:noFill/>
-          <a:ln w="25400" cap="flat" cmpd="sng" algn="ctr">
-            <a:solidFill>
-              <a:srgbClr val="00B050"/>
-            </a:solidFill>
-            <a:prstDash val="solid"/>
-            <a:round/>
-            <a:headEnd type="none" w="med" len="med"/>
-            <a:tailEnd type="none" w="med" len="med"/>
-          </a:ln>
-          <a:effectLst>
-            <a:outerShdw blurRad="50800" dist="38100" dir="2700000" algn="tl" rotWithShape="0">
-              <a:prstClr val="black">
-                <a:alpha val="40000"/>
-              </a:prstClr>
-            </a:outerShdw>
-          </a:effectLst>
-        </p:spPr>
-      </p:cxnSp>
-      <p:cxnSp>
-        <p:nvCxnSpPr>
-          <p:cNvPr id="108" name="Gerade Verbindung mit Pfeil 107">
-            <a:extLst>
-              <a:ext uri="{FF2B5EF4-FFF2-40B4-BE49-F238E27FC236}">
-                <a16:creationId xmlns:a16="http://schemas.microsoft.com/office/drawing/2014/main" id="{89AC0BCD-9B85-417C-86DD-31F6D26CD7CA}"/>
-              </a:ext>
-            </a:extLst>
-          </p:cNvPr>
-          <p:cNvCxnSpPr>
-            <a:cxnSpLocks/>
-            <a:stCxn id="86" idx="2"/>
-            <a:endCxn id="244" idx="3"/>
-          </p:cNvCxnSpPr>
-          <p:nvPr/>
-        </p:nvCxnSpPr>
-        <p:spPr>
-          <a:xfrm>
-            <a:off x="2168921" y="1780060"/>
-            <a:ext cx="485152" cy="1844757"/>
+            <a:off x="2501683" y="1499671"/>
+            <a:ext cx="5463018" cy="2364247"/>
           </a:xfrm>
           <a:prstGeom prst="straightConnector1">
             <a:avLst/>
@@ -5894,51 +6154,8 @@
         </p:nvCxnSpPr>
         <p:spPr>
           <a:xfrm>
-            <a:off x="1600786" y="2659155"/>
-            <a:ext cx="6363915" cy="1204763"/>
-          </a:xfrm>
-          <a:prstGeom prst="straightConnector1">
-            <a:avLst/>
-          </a:prstGeom>
-          <a:noFill/>
-          <a:ln w="38100" cap="flat" cmpd="sng" algn="ctr">
-            <a:solidFill>
-              <a:srgbClr val="00B050"/>
-            </a:solidFill>
-            <a:prstDash val="solid"/>
-            <a:round/>
-            <a:headEnd type="none" w="med" len="med"/>
-            <a:tailEnd type="none" w="med" len="med"/>
-          </a:ln>
-          <a:effectLst>
-            <a:outerShdw blurRad="50800" dist="38100" dir="2700000" algn="tl" rotWithShape="0">
-              <a:prstClr val="black">
-                <a:alpha val="40000"/>
-              </a:prstClr>
-            </a:outerShdw>
-          </a:effectLst>
-        </p:spPr>
-      </p:cxnSp>
-      <p:cxnSp>
-        <p:nvCxnSpPr>
-          <p:cNvPr id="140" name="Gerade Verbindung mit Pfeil 139">
-            <a:extLst>
-              <a:ext uri="{FF2B5EF4-FFF2-40B4-BE49-F238E27FC236}">
-                <a16:creationId xmlns:a16="http://schemas.microsoft.com/office/drawing/2014/main" id="{8A96EBF3-887E-4E23-BC0F-246AEE2D44B3}"/>
-              </a:ext>
-            </a:extLst>
-          </p:cNvPr>
-          <p:cNvCxnSpPr>
-            <a:cxnSpLocks/>
-            <a:stCxn id="82" idx="2"/>
-            <a:endCxn id="277" idx="3"/>
-          </p:cNvCxnSpPr>
-          <p:nvPr/>
-        </p:nvCxnSpPr>
-        <p:spPr>
-          <a:xfrm>
-            <a:off x="1600786" y="2659155"/>
-            <a:ext cx="4767465" cy="1745856"/>
+            <a:off x="1537286" y="2659155"/>
+            <a:ext cx="6427415" cy="1204763"/>
           </a:xfrm>
           <a:prstGeom prst="straightConnector1">
             <a:avLst/>
@@ -5980,8 +6197,8 @@
         </p:nvCxnSpPr>
         <p:spPr>
           <a:xfrm>
-            <a:off x="1600786" y="2659155"/>
-            <a:ext cx="1053287" cy="965662"/>
+            <a:off x="1537286" y="2659155"/>
+            <a:ext cx="1120082" cy="963626"/>
           </a:xfrm>
           <a:prstGeom prst="straightConnector1">
             <a:avLst/>
@@ -6017,14 +6234,13 @@
           <p:cNvCxnSpPr>
             <a:cxnSpLocks/>
             <a:stCxn id="82" idx="2"/>
-            <a:endCxn id="253" idx="3"/>
           </p:cNvCxnSpPr>
           <p:nvPr/>
         </p:nvCxnSpPr>
         <p:spPr>
           <a:xfrm>
-            <a:off x="1600786" y="2659155"/>
-            <a:ext cx="2565749" cy="1451736"/>
+            <a:off x="1537286" y="2659155"/>
+            <a:ext cx="2629249" cy="1451736"/>
           </a:xfrm>
           <a:prstGeom prst="straightConnector1">
             <a:avLst/>
@@ -6108,7 +6324,7 @@
         </p:nvCxnSpPr>
         <p:spPr>
           <a:xfrm flipV="1">
-            <a:off x="2193023" y="818747"/>
+            <a:off x="2129523" y="818747"/>
             <a:ext cx="4550129" cy="1694214"/>
           </a:xfrm>
           <a:prstGeom prst="straightConnector1">
@@ -6194,124 +6410,6 @@
       </p:sp>
       <p:sp>
         <p:nvSpPr>
-          <p:cNvPr id="244" name="Gleichschenkliges Dreieck 243">
-            <a:extLst>
-              <a:ext uri="{FF2B5EF4-FFF2-40B4-BE49-F238E27FC236}">
-                <a16:creationId xmlns:a16="http://schemas.microsoft.com/office/drawing/2014/main" id="{F387589C-E349-4DAC-8146-D780AB632BC4}"/>
-              </a:ext>
-            </a:extLst>
-          </p:cNvPr>
-          <p:cNvSpPr/>
-          <p:nvPr/>
-        </p:nvSpPr>
-        <p:spPr>
-          <a:xfrm rot="8773857">
-            <a:off x="2630089" y="3615706"/>
-            <a:ext cx="108000" cy="108000"/>
-          </a:xfrm>
-          <a:prstGeom prst="triangle">
-            <a:avLst/>
-          </a:prstGeom>
-          <a:solidFill>
-            <a:srgbClr val="00B050"/>
-          </a:solidFill>
-          <a:ln>
-            <a:noFill/>
-          </a:ln>
-          <a:effectLst>
-            <a:outerShdw blurRad="50800" dist="38100" dir="2700000" algn="tl" rotWithShape="0">
-              <a:prstClr val="black">
-                <a:alpha val="40000"/>
-              </a:prstClr>
-            </a:outerShdw>
-          </a:effectLst>
-        </p:spPr>
-        <p:style>
-          <a:lnRef idx="2">
-            <a:schemeClr val="accent1">
-              <a:shade val="50000"/>
-            </a:schemeClr>
-          </a:lnRef>
-          <a:fillRef idx="1">
-            <a:schemeClr val="accent1"/>
-          </a:fillRef>
-          <a:effectRef idx="0">
-            <a:schemeClr val="accent1"/>
-          </a:effectRef>
-          <a:fontRef idx="minor">
-            <a:schemeClr val="lt1"/>
-          </a:fontRef>
-        </p:style>
-        <p:txBody>
-          <a:bodyPr rtlCol="0" anchor="ctr"/>
-          <a:lstStyle/>
-          <a:p>
-            <a:pPr algn="ctr"/>
-            <a:endParaRPr lang="en-US"/>
-          </a:p>
-        </p:txBody>
-      </p:sp>
-      <p:sp>
-        <p:nvSpPr>
-          <p:cNvPr id="253" name="Gleichschenkliges Dreieck 252">
-            <a:extLst>
-              <a:ext uri="{FF2B5EF4-FFF2-40B4-BE49-F238E27FC236}">
-                <a16:creationId xmlns:a16="http://schemas.microsoft.com/office/drawing/2014/main" id="{DEAC0FB0-2A94-4D67-88DF-E76E683F63A8}"/>
-              </a:ext>
-            </a:extLst>
-          </p:cNvPr>
-          <p:cNvSpPr/>
-          <p:nvPr/>
-        </p:nvSpPr>
-        <p:spPr>
-          <a:xfrm rot="7070402">
-            <a:off x="4160285" y="4082109"/>
-            <a:ext cx="108000" cy="108000"/>
-          </a:xfrm>
-          <a:prstGeom prst="triangle">
-            <a:avLst/>
-          </a:prstGeom>
-          <a:solidFill>
-            <a:srgbClr val="00B050"/>
-          </a:solidFill>
-          <a:ln>
-            <a:noFill/>
-          </a:ln>
-          <a:effectLst>
-            <a:outerShdw blurRad="50800" dist="38100" dir="2700000" algn="tl" rotWithShape="0">
-              <a:prstClr val="black">
-                <a:alpha val="40000"/>
-              </a:prstClr>
-            </a:outerShdw>
-          </a:effectLst>
-        </p:spPr>
-        <p:style>
-          <a:lnRef idx="2">
-            <a:schemeClr val="accent1">
-              <a:shade val="50000"/>
-            </a:schemeClr>
-          </a:lnRef>
-          <a:fillRef idx="1">
-            <a:schemeClr val="accent1"/>
-          </a:fillRef>
-          <a:effectRef idx="0">
-            <a:schemeClr val="accent1"/>
-          </a:effectRef>
-          <a:fontRef idx="minor">
-            <a:schemeClr val="lt1"/>
-          </a:fontRef>
-        </p:style>
-        <p:txBody>
-          <a:bodyPr rtlCol="0" anchor="ctr"/>
-          <a:lstStyle/>
-          <a:p>
-            <a:pPr algn="ctr"/>
-            <a:endParaRPr lang="en-US"/>
-          </a:p>
-        </p:txBody>
-      </p:sp>
-      <p:sp>
-        <p:nvSpPr>
           <p:cNvPr id="260" name="Gleichschenkliges Dreieck 259">
             <a:extLst>
               <a:ext uri="{FF2B5EF4-FFF2-40B4-BE49-F238E27FC236}">
@@ -6332,65 +6430,6 @@
           </a:prstGeom>
           <a:solidFill>
             <a:srgbClr val="C00000"/>
-          </a:solidFill>
-          <a:ln>
-            <a:noFill/>
-          </a:ln>
-          <a:effectLst>
-            <a:outerShdw blurRad="50800" dist="38100" dir="2700000" algn="tl" rotWithShape="0">
-              <a:prstClr val="black">
-                <a:alpha val="40000"/>
-              </a:prstClr>
-            </a:outerShdw>
-          </a:effectLst>
-        </p:spPr>
-        <p:style>
-          <a:lnRef idx="2">
-            <a:schemeClr val="accent1">
-              <a:shade val="50000"/>
-            </a:schemeClr>
-          </a:lnRef>
-          <a:fillRef idx="1">
-            <a:schemeClr val="accent1"/>
-          </a:fillRef>
-          <a:effectRef idx="0">
-            <a:schemeClr val="accent1"/>
-          </a:effectRef>
-          <a:fontRef idx="minor">
-            <a:schemeClr val="lt1"/>
-          </a:fontRef>
-        </p:style>
-        <p:txBody>
-          <a:bodyPr rtlCol="0" anchor="ctr"/>
-          <a:lstStyle/>
-          <a:p>
-            <a:pPr algn="ctr"/>
-            <a:endParaRPr lang="en-US"/>
-          </a:p>
-        </p:txBody>
-      </p:sp>
-      <p:sp>
-        <p:nvSpPr>
-          <p:cNvPr id="277" name="Gleichschenkliges Dreieck 276">
-            <a:extLst>
-              <a:ext uri="{FF2B5EF4-FFF2-40B4-BE49-F238E27FC236}">
-                <a16:creationId xmlns:a16="http://schemas.microsoft.com/office/drawing/2014/main" id="{86EEBB6A-E241-42CE-AC13-98EBAF3ABA44}"/>
-              </a:ext>
-            </a:extLst>
-          </p:cNvPr>
-          <p:cNvSpPr/>
-          <p:nvPr/>
-        </p:nvSpPr>
-        <p:spPr>
-          <a:xfrm rot="6379525">
-            <a:off x="6366074" y="4366190"/>
-            <a:ext cx="108000" cy="108000"/>
-          </a:xfrm>
-          <a:prstGeom prst="triangle">
-            <a:avLst/>
-          </a:prstGeom>
-          <a:solidFill>
-            <a:srgbClr val="00B050"/>
           </a:solidFill>
           <a:ln>
             <a:noFill/>
@@ -6678,7 +6717,7 @@
         </p:nvSpPr>
         <p:spPr>
           <a:xfrm rot="4060640">
-            <a:off x="6726744" y="753125"/>
+            <a:off x="6668663" y="746481"/>
             <a:ext cx="108000" cy="108000"/>
           </a:xfrm>
           <a:prstGeom prst="triangle">
@@ -7960,6 +7999,772 @@
           </p:txBody>
         </p:sp>
       </p:grpSp>
+      <p:sp>
+        <p:nvSpPr>
+          <p:cNvPr id="68" name="Textfeld 85">
+            <a:extLst>
+              <a:ext uri="{FF2B5EF4-FFF2-40B4-BE49-F238E27FC236}">
+                <a16:creationId xmlns:a16="http://schemas.microsoft.com/office/drawing/2014/main" id="{50FF466E-8DF8-43C2-B89B-AF0A7B2601C5}"/>
+              </a:ext>
+            </a:extLst>
+          </p:cNvPr>
+          <p:cNvSpPr txBox="1"/>
+          <p:nvPr/>
+        </p:nvSpPr>
+        <p:spPr>
+          <a:xfrm>
+            <a:off x="596346" y="1761401"/>
+            <a:ext cx="1785754" cy="292388"/>
+          </a:xfrm>
+          <a:prstGeom prst="rect">
+            <a:avLst/>
+          </a:prstGeom>
+          <a:noFill/>
+          <a:effectLst/>
+        </p:spPr>
+        <p:txBody>
+          <a:bodyPr wrap="square" rIns="0" bIns="0" rtlCol="0" anchor="ctr">
+            <a:spAutoFit/>
+          </a:bodyPr>
+          <a:lstStyle/>
+          <a:p>
+            <a:pPr marL="0" marR="0" lvl="0" indent="0" algn="r" defTabSz="1221456" eaLnBrk="1" fontAlgn="auto" latinLnBrk="0" hangingPunct="1">
+              <a:lnSpc>
+                <a:spcPct val="100000"/>
+              </a:lnSpc>
+              <a:spcBef>
+                <a:spcPts val="0"/>
+              </a:spcBef>
+              <a:spcAft>
+                <a:spcPts val="0"/>
+              </a:spcAft>
+              <a:buClrTx/>
+              <a:buSzTx/>
+              <a:buFontTx/>
+              <a:buNone/>
+              <a:tabLst/>
+              <a:defRPr/>
+            </a:pPr>
+            <a:r>
+              <a:rPr kumimoji="0" lang="en-US" sz="1600" b="1" i="0" u="none" strike="noStrike" kern="0" cap="none" spc="0" normalizeH="0" baseline="0" noProof="0" dirty="0">
+                <a:ln>
+                  <a:noFill/>
+                </a:ln>
+                <a:solidFill>
+                  <a:srgbClr val="10384F"/>
+                </a:solidFill>
+                <a:effectLst/>
+                <a:uLnTx/>
+                <a:uFillTx/>
+                <a:latin typeface="Arial"/>
+                <a:cs typeface="Calibri" panose="020F0502020204030204" pitchFamily="34" charset="0"/>
+              </a:rPr>
+              <a:t>Carbamazepine</a:t>
+            </a:r>
+            <a:endParaRPr kumimoji="0" lang="de-DE" sz="1600" b="1" i="0" u="none" strike="noStrike" kern="0" cap="none" spc="0" normalizeH="0" baseline="0" noProof="0" dirty="0">
+              <a:ln>
+                <a:noFill/>
+              </a:ln>
+              <a:solidFill>
+                <a:srgbClr val="10384F"/>
+              </a:solidFill>
+              <a:effectLst/>
+              <a:uLnTx/>
+              <a:uFillTx/>
+              <a:latin typeface="Arial"/>
+              <a:cs typeface="Calibri" panose="020F0502020204030204" pitchFamily="34" charset="0"/>
+            </a:endParaRPr>
+          </a:p>
+        </p:txBody>
+      </p:sp>
+      <p:cxnSp>
+        <p:nvCxnSpPr>
+          <p:cNvPr id="92" name="Gerade Verbindung mit Pfeil 142">
+            <a:extLst>
+              <a:ext uri="{FF2B5EF4-FFF2-40B4-BE49-F238E27FC236}">
+                <a16:creationId xmlns:a16="http://schemas.microsoft.com/office/drawing/2014/main" id="{84ED9C60-9627-4B93-92C1-7FDF9D8F45CA}"/>
+              </a:ext>
+            </a:extLst>
+          </p:cNvPr>
+          <p:cNvCxnSpPr>
+            <a:cxnSpLocks/>
+            <a:endCxn id="244" idx="3"/>
+          </p:cNvCxnSpPr>
+          <p:nvPr/>
+        </p:nvCxnSpPr>
+        <p:spPr>
+          <a:xfrm>
+            <a:off x="2159713" y="2060139"/>
+            <a:ext cx="497655" cy="1562642"/>
+          </a:xfrm>
+          <a:prstGeom prst="straightConnector1">
+            <a:avLst/>
+          </a:prstGeom>
+          <a:noFill/>
+          <a:ln w="38100" cap="flat" cmpd="sng" algn="ctr">
+            <a:solidFill>
+              <a:srgbClr val="00B050"/>
+            </a:solidFill>
+            <a:prstDash val="solid"/>
+            <a:round/>
+            <a:headEnd type="none" w="med" len="med"/>
+            <a:tailEnd type="none" w="med" len="med"/>
+          </a:ln>
+          <a:effectLst>
+            <a:outerShdw blurRad="50800" dist="38100" dir="2700000" algn="tl" rotWithShape="0">
+              <a:prstClr val="black">
+                <a:alpha val="40000"/>
+              </a:prstClr>
+            </a:outerShdw>
+          </a:effectLst>
+        </p:spPr>
+      </p:cxnSp>
+      <p:cxnSp>
+        <p:nvCxnSpPr>
+          <p:cNvPr id="93" name="Gerade Verbindung mit Pfeil 142">
+            <a:extLst>
+              <a:ext uri="{FF2B5EF4-FFF2-40B4-BE49-F238E27FC236}">
+                <a16:creationId xmlns:a16="http://schemas.microsoft.com/office/drawing/2014/main" id="{07AEED44-F50E-43CD-A8EB-B2D4494ACE1C}"/>
+              </a:ext>
+            </a:extLst>
+          </p:cNvPr>
+          <p:cNvCxnSpPr>
+            <a:cxnSpLocks/>
+          </p:cNvCxnSpPr>
+          <p:nvPr/>
+        </p:nvCxnSpPr>
+        <p:spPr>
+          <a:xfrm>
+            <a:off x="2156615" y="2060139"/>
+            <a:ext cx="4211636" cy="2344872"/>
+          </a:xfrm>
+          <a:prstGeom prst="straightConnector1">
+            <a:avLst/>
+          </a:prstGeom>
+          <a:noFill/>
+          <a:ln w="38100" cap="flat" cmpd="sng" algn="ctr">
+            <a:solidFill>
+              <a:srgbClr val="00B050"/>
+            </a:solidFill>
+            <a:prstDash val="solid"/>
+            <a:round/>
+            <a:headEnd type="none" w="med" len="med"/>
+            <a:tailEnd type="none" w="med" len="med"/>
+          </a:ln>
+          <a:effectLst>
+            <a:outerShdw blurRad="50800" dist="38100" dir="2700000" algn="tl" rotWithShape="0">
+              <a:prstClr val="black">
+                <a:alpha val="40000"/>
+              </a:prstClr>
+            </a:outerShdw>
+          </a:effectLst>
+        </p:spPr>
+      </p:cxnSp>
+      <p:cxnSp>
+        <p:nvCxnSpPr>
+          <p:cNvPr id="140" name="Gerade Verbindung mit Pfeil 139">
+            <a:extLst>
+              <a:ext uri="{FF2B5EF4-FFF2-40B4-BE49-F238E27FC236}">
+                <a16:creationId xmlns:a16="http://schemas.microsoft.com/office/drawing/2014/main" id="{8A96EBF3-887E-4E23-BC0F-246AEE2D44B3}"/>
+              </a:ext>
+            </a:extLst>
+          </p:cNvPr>
+          <p:cNvCxnSpPr>
+            <a:cxnSpLocks/>
+            <a:stCxn id="82" idx="2"/>
+          </p:cNvCxnSpPr>
+          <p:nvPr/>
+        </p:nvCxnSpPr>
+        <p:spPr>
+          <a:xfrm>
+            <a:off x="1537286" y="2659155"/>
+            <a:ext cx="4830965" cy="1745856"/>
+          </a:xfrm>
+          <a:prstGeom prst="straightConnector1">
+            <a:avLst/>
+          </a:prstGeom>
+          <a:noFill/>
+          <a:ln w="38100" cap="flat" cmpd="sng" algn="ctr">
+            <a:solidFill>
+              <a:srgbClr val="00B050"/>
+            </a:solidFill>
+            <a:prstDash val="solid"/>
+            <a:round/>
+            <a:headEnd type="none" w="med" len="med"/>
+            <a:tailEnd type="none" w="med" len="med"/>
+          </a:ln>
+          <a:effectLst>
+            <a:outerShdw blurRad="50800" dist="38100" dir="2700000" algn="tl" rotWithShape="0">
+              <a:prstClr val="black">
+                <a:alpha val="40000"/>
+              </a:prstClr>
+            </a:outerShdw>
+          </a:effectLst>
+        </p:spPr>
+      </p:cxnSp>
+      <p:cxnSp>
+        <p:nvCxnSpPr>
+          <p:cNvPr id="108" name="Gerade Verbindung mit Pfeil 107">
+            <a:extLst>
+              <a:ext uri="{FF2B5EF4-FFF2-40B4-BE49-F238E27FC236}">
+                <a16:creationId xmlns:a16="http://schemas.microsoft.com/office/drawing/2014/main" id="{89AC0BCD-9B85-417C-86DD-31F6D26CD7CA}"/>
+              </a:ext>
+            </a:extLst>
+          </p:cNvPr>
+          <p:cNvCxnSpPr>
+            <a:cxnSpLocks/>
+            <a:endCxn id="244" idx="3"/>
+          </p:cNvCxnSpPr>
+          <p:nvPr/>
+        </p:nvCxnSpPr>
+        <p:spPr>
+          <a:xfrm>
+            <a:off x="2501683" y="1493182"/>
+            <a:ext cx="155685" cy="2129599"/>
+          </a:xfrm>
+          <a:prstGeom prst="straightConnector1">
+            <a:avLst/>
+          </a:prstGeom>
+          <a:noFill/>
+          <a:ln w="25400" cap="flat" cmpd="sng" algn="ctr">
+            <a:solidFill>
+              <a:srgbClr val="00B050"/>
+            </a:solidFill>
+            <a:prstDash val="solid"/>
+            <a:round/>
+            <a:headEnd type="none" w="med" len="med"/>
+            <a:tailEnd type="none" w="med" len="med"/>
+          </a:ln>
+          <a:effectLst>
+            <a:outerShdw blurRad="50800" dist="38100" dir="2700000" algn="tl" rotWithShape="0">
+              <a:prstClr val="black">
+                <a:alpha val="40000"/>
+              </a:prstClr>
+            </a:outerShdw>
+          </a:effectLst>
+        </p:spPr>
+      </p:cxnSp>
+      <p:sp>
+        <p:nvSpPr>
+          <p:cNvPr id="244" name="Gleichschenkliges Dreieck 243">
+            <a:extLst>
+              <a:ext uri="{FF2B5EF4-FFF2-40B4-BE49-F238E27FC236}">
+                <a16:creationId xmlns:a16="http://schemas.microsoft.com/office/drawing/2014/main" id="{F387589C-E349-4DAC-8146-D780AB632BC4}"/>
+              </a:ext>
+            </a:extLst>
+          </p:cNvPr>
+          <p:cNvSpPr/>
+          <p:nvPr/>
+        </p:nvSpPr>
+        <p:spPr>
+          <a:xfrm rot="9020490">
+            <a:off x="2630089" y="3615706"/>
+            <a:ext cx="108000" cy="108000"/>
+          </a:xfrm>
+          <a:prstGeom prst="triangle">
+            <a:avLst/>
+          </a:prstGeom>
+          <a:solidFill>
+            <a:srgbClr val="00B050"/>
+          </a:solidFill>
+          <a:ln>
+            <a:noFill/>
+          </a:ln>
+          <a:effectLst>
+            <a:outerShdw blurRad="50800" dist="38100" dir="2700000" algn="tl" rotWithShape="0">
+              <a:prstClr val="black">
+                <a:alpha val="40000"/>
+              </a:prstClr>
+            </a:outerShdw>
+          </a:effectLst>
+        </p:spPr>
+        <p:style>
+          <a:lnRef idx="2">
+            <a:schemeClr val="accent1">
+              <a:shade val="50000"/>
+            </a:schemeClr>
+          </a:lnRef>
+          <a:fillRef idx="1">
+            <a:schemeClr val="accent1"/>
+          </a:fillRef>
+          <a:effectRef idx="0">
+            <a:schemeClr val="accent1"/>
+          </a:effectRef>
+          <a:fontRef idx="minor">
+            <a:schemeClr val="lt1"/>
+          </a:fontRef>
+        </p:style>
+        <p:txBody>
+          <a:bodyPr rtlCol="0" anchor="ctr"/>
+          <a:lstStyle/>
+          <a:p>
+            <a:pPr algn="ctr"/>
+            <a:endParaRPr lang="en-US"/>
+          </a:p>
+        </p:txBody>
+      </p:sp>
+      <p:sp>
+        <p:nvSpPr>
+          <p:cNvPr id="128" name="Gleichschenkliges Dreieck 252">
+            <a:extLst>
+              <a:ext uri="{FF2B5EF4-FFF2-40B4-BE49-F238E27FC236}">
+                <a16:creationId xmlns:a16="http://schemas.microsoft.com/office/drawing/2014/main" id="{D75756B5-F1D7-4970-8235-9450C3BB75A8}"/>
+              </a:ext>
+            </a:extLst>
+          </p:cNvPr>
+          <p:cNvSpPr/>
+          <p:nvPr/>
+        </p:nvSpPr>
+        <p:spPr>
+          <a:xfrm rot="12500572">
+            <a:off x="2301776" y="1733598"/>
+            <a:ext cx="108000" cy="108000"/>
+          </a:xfrm>
+          <a:prstGeom prst="triangle">
+            <a:avLst/>
+          </a:prstGeom>
+          <a:solidFill>
+            <a:srgbClr val="00B050"/>
+          </a:solidFill>
+          <a:ln>
+            <a:noFill/>
+          </a:ln>
+          <a:effectLst>
+            <a:outerShdw blurRad="50800" dist="38100" dir="2700000" algn="tl" rotWithShape="0">
+              <a:prstClr val="black">
+                <a:alpha val="40000"/>
+              </a:prstClr>
+            </a:outerShdw>
+          </a:effectLst>
+        </p:spPr>
+        <p:style>
+          <a:lnRef idx="2">
+            <a:schemeClr val="accent1">
+              <a:shade val="50000"/>
+            </a:schemeClr>
+          </a:lnRef>
+          <a:fillRef idx="1">
+            <a:schemeClr val="accent1"/>
+          </a:fillRef>
+          <a:effectRef idx="0">
+            <a:schemeClr val="accent1"/>
+          </a:effectRef>
+          <a:fontRef idx="minor">
+            <a:schemeClr val="lt1"/>
+          </a:fontRef>
+        </p:style>
+        <p:txBody>
+          <a:bodyPr rtlCol="0" anchor="ctr"/>
+          <a:lstStyle/>
+          <a:p>
+            <a:pPr algn="ctr"/>
+            <a:endParaRPr lang="en-US"/>
+          </a:p>
+        </p:txBody>
+      </p:sp>
+      <p:cxnSp>
+        <p:nvCxnSpPr>
+          <p:cNvPr id="119" name="Gerade Verbindung mit Pfeil 107">
+            <a:extLst>
+              <a:ext uri="{FF2B5EF4-FFF2-40B4-BE49-F238E27FC236}">
+                <a16:creationId xmlns:a16="http://schemas.microsoft.com/office/drawing/2014/main" id="{7D07BA42-CA0B-4872-A6F5-88E18BF45201}"/>
+              </a:ext>
+            </a:extLst>
+          </p:cNvPr>
+          <p:cNvCxnSpPr>
+            <a:cxnSpLocks/>
+          </p:cNvCxnSpPr>
+          <p:nvPr/>
+        </p:nvCxnSpPr>
+        <p:spPr>
+          <a:xfrm flipH="1">
+            <a:off x="2376650" y="1488580"/>
+            <a:ext cx="129908" cy="258634"/>
+          </a:xfrm>
+          <a:prstGeom prst="straightConnector1">
+            <a:avLst/>
+          </a:prstGeom>
+          <a:noFill/>
+          <a:ln w="25400" cap="flat" cmpd="sng" algn="ctr">
+            <a:solidFill>
+              <a:srgbClr val="00B050"/>
+            </a:solidFill>
+            <a:prstDash val="solid"/>
+            <a:round/>
+            <a:headEnd type="none" w="med" len="med"/>
+            <a:tailEnd type="none" w="med" len="med"/>
+          </a:ln>
+          <a:effectLst>
+            <a:outerShdw blurRad="50800" dist="38100" dir="2700000" algn="tl" rotWithShape="0">
+              <a:prstClr val="black">
+                <a:alpha val="40000"/>
+              </a:prstClr>
+            </a:outerShdw>
+          </a:effectLst>
+        </p:spPr>
+      </p:cxnSp>
+      <p:sp>
+        <p:nvSpPr>
+          <p:cNvPr id="130" name="Gleichschenkliges Dreieck 252">
+            <a:extLst>
+              <a:ext uri="{FF2B5EF4-FFF2-40B4-BE49-F238E27FC236}">
+                <a16:creationId xmlns:a16="http://schemas.microsoft.com/office/drawing/2014/main" id="{C57BCDDB-579F-4F27-9C24-60F05BC17FB4}"/>
+              </a:ext>
+            </a:extLst>
+          </p:cNvPr>
+          <p:cNvSpPr/>
+          <p:nvPr/>
+        </p:nvSpPr>
+        <p:spPr>
+          <a:xfrm rot="7070402">
+            <a:off x="4153142" y="4077347"/>
+            <a:ext cx="108000" cy="108000"/>
+          </a:xfrm>
+          <a:prstGeom prst="triangle">
+            <a:avLst/>
+          </a:prstGeom>
+          <a:solidFill>
+            <a:srgbClr val="00B050"/>
+          </a:solidFill>
+          <a:ln>
+            <a:noFill/>
+          </a:ln>
+          <a:effectLst>
+            <a:outerShdw blurRad="50800" dist="38100" dir="2700000" algn="tl" rotWithShape="0">
+              <a:prstClr val="black">
+                <a:alpha val="40000"/>
+              </a:prstClr>
+            </a:outerShdw>
+          </a:effectLst>
+        </p:spPr>
+        <p:style>
+          <a:lnRef idx="2">
+            <a:schemeClr val="accent1">
+              <a:shade val="50000"/>
+            </a:schemeClr>
+          </a:lnRef>
+          <a:fillRef idx="1">
+            <a:schemeClr val="accent1"/>
+          </a:fillRef>
+          <a:effectRef idx="0">
+            <a:schemeClr val="accent1"/>
+          </a:effectRef>
+          <a:fontRef idx="minor">
+            <a:schemeClr val="lt1"/>
+          </a:fontRef>
+        </p:style>
+        <p:txBody>
+          <a:bodyPr rtlCol="0" anchor="ctr"/>
+          <a:lstStyle/>
+          <a:p>
+            <a:pPr algn="ctr"/>
+            <a:endParaRPr lang="en-US"/>
+          </a:p>
+        </p:txBody>
+      </p:sp>
+      <p:sp>
+        <p:nvSpPr>
+          <p:cNvPr id="131" name="Gleichschenkliges Dreieck 276">
+            <a:extLst>
+              <a:ext uri="{FF2B5EF4-FFF2-40B4-BE49-F238E27FC236}">
+                <a16:creationId xmlns:a16="http://schemas.microsoft.com/office/drawing/2014/main" id="{D7FAA8E7-A924-4F21-98D1-078B92D34E01}"/>
+              </a:ext>
+            </a:extLst>
+          </p:cNvPr>
+          <p:cNvSpPr/>
+          <p:nvPr/>
+        </p:nvSpPr>
+        <p:spPr>
+          <a:xfrm rot="6653607">
+            <a:off x="6358931" y="4370952"/>
+            <a:ext cx="108000" cy="108000"/>
+          </a:xfrm>
+          <a:prstGeom prst="triangle">
+            <a:avLst/>
+          </a:prstGeom>
+          <a:solidFill>
+            <a:srgbClr val="00B050"/>
+          </a:solidFill>
+          <a:ln>
+            <a:noFill/>
+          </a:ln>
+          <a:effectLst>
+            <a:outerShdw blurRad="50800" dist="38100" dir="2700000" algn="tl" rotWithShape="0">
+              <a:prstClr val="black">
+                <a:alpha val="40000"/>
+              </a:prstClr>
+            </a:outerShdw>
+          </a:effectLst>
+        </p:spPr>
+        <p:style>
+          <a:lnRef idx="2">
+            <a:schemeClr val="accent1">
+              <a:shade val="50000"/>
+            </a:schemeClr>
+          </a:lnRef>
+          <a:fillRef idx="1">
+            <a:schemeClr val="accent1"/>
+          </a:fillRef>
+          <a:effectRef idx="0">
+            <a:schemeClr val="accent1"/>
+          </a:effectRef>
+          <a:fontRef idx="minor">
+            <a:schemeClr val="lt1"/>
+          </a:fontRef>
+        </p:style>
+        <p:txBody>
+          <a:bodyPr rtlCol="0" anchor="ctr"/>
+          <a:lstStyle/>
+          <a:p>
+            <a:pPr algn="ctr"/>
+            <a:endParaRPr lang="en-US"/>
+          </a:p>
+        </p:txBody>
+      </p:sp>
+      <p:cxnSp>
+        <p:nvCxnSpPr>
+          <p:cNvPr id="132" name="Gerade Verbindung mit Pfeil 111">
+            <a:extLst>
+              <a:ext uri="{FF2B5EF4-FFF2-40B4-BE49-F238E27FC236}">
+                <a16:creationId xmlns:a16="http://schemas.microsoft.com/office/drawing/2014/main" id="{7854DC59-44F2-4CC9-9B92-B9A2DF0A9599}"/>
+              </a:ext>
+            </a:extLst>
+          </p:cNvPr>
+          <p:cNvCxnSpPr>
+            <a:cxnSpLocks/>
+            <a:stCxn id="74" idx="2"/>
+          </p:cNvCxnSpPr>
+          <p:nvPr/>
+        </p:nvCxnSpPr>
+        <p:spPr>
+          <a:xfrm flipH="1">
+            <a:off x="2496811" y="1165304"/>
+            <a:ext cx="5752294" cy="779431"/>
+          </a:xfrm>
+          <a:prstGeom prst="straightConnector1">
+            <a:avLst/>
+          </a:prstGeom>
+          <a:noFill/>
+          <a:ln w="25400" cap="flat" cmpd="sng" algn="ctr">
+            <a:solidFill>
+              <a:srgbClr val="C00000"/>
+            </a:solidFill>
+            <a:prstDash val="solid"/>
+            <a:round/>
+            <a:headEnd type="none" w="med" len="med"/>
+            <a:tailEnd type="none" w="med" len="med"/>
+          </a:ln>
+          <a:effectLst>
+            <a:outerShdw blurRad="50800" dist="38100" dir="2700000" algn="tl" rotWithShape="0">
+              <a:prstClr val="black">
+                <a:alpha val="40000"/>
+              </a:prstClr>
+            </a:outerShdw>
+          </a:effectLst>
+        </p:spPr>
+      </p:cxnSp>
+      <p:sp>
+        <p:nvSpPr>
+          <p:cNvPr id="135" name="Gleichschenkliges Dreieck 259">
+            <a:extLst>
+              <a:ext uri="{FF2B5EF4-FFF2-40B4-BE49-F238E27FC236}">
+                <a16:creationId xmlns:a16="http://schemas.microsoft.com/office/drawing/2014/main" id="{B4A4A427-3DC5-489E-BAF2-660A57CC0AAA}"/>
+              </a:ext>
+            </a:extLst>
+          </p:cNvPr>
+          <p:cNvSpPr/>
+          <p:nvPr/>
+        </p:nvSpPr>
+        <p:spPr>
+          <a:xfrm rot="15688735">
+            <a:off x="2392938" y="1890126"/>
+            <a:ext cx="108000" cy="108000"/>
+          </a:xfrm>
+          <a:prstGeom prst="triangle">
+            <a:avLst/>
+          </a:prstGeom>
+          <a:solidFill>
+            <a:srgbClr val="C00000"/>
+          </a:solidFill>
+          <a:ln>
+            <a:noFill/>
+          </a:ln>
+          <a:effectLst>
+            <a:outerShdw blurRad="50800" dist="38100" dir="2700000" algn="tl" rotWithShape="0">
+              <a:prstClr val="black">
+                <a:alpha val="40000"/>
+              </a:prstClr>
+            </a:outerShdw>
+          </a:effectLst>
+        </p:spPr>
+        <p:style>
+          <a:lnRef idx="2">
+            <a:schemeClr val="accent1">
+              <a:shade val="50000"/>
+            </a:schemeClr>
+          </a:lnRef>
+          <a:fillRef idx="1">
+            <a:schemeClr val="accent1"/>
+          </a:fillRef>
+          <a:effectRef idx="0">
+            <a:schemeClr val="accent1"/>
+          </a:effectRef>
+          <a:fontRef idx="minor">
+            <a:schemeClr val="lt1"/>
+          </a:fontRef>
+        </p:style>
+        <p:txBody>
+          <a:bodyPr rtlCol="0" anchor="ctr"/>
+          <a:lstStyle/>
+          <a:p>
+            <a:pPr algn="ctr"/>
+            <a:endParaRPr lang="en-US"/>
+          </a:p>
+        </p:txBody>
+      </p:sp>
+      <p:cxnSp>
+        <p:nvCxnSpPr>
+          <p:cNvPr id="141" name="Gerade Verbindung mit Pfeil 142">
+            <a:extLst>
+              <a:ext uri="{FF2B5EF4-FFF2-40B4-BE49-F238E27FC236}">
+                <a16:creationId xmlns:a16="http://schemas.microsoft.com/office/drawing/2014/main" id="{D756DE5F-91B3-4242-AC21-1F6296FE0CE4}"/>
+              </a:ext>
+            </a:extLst>
+          </p:cNvPr>
+          <p:cNvCxnSpPr>
+            <a:cxnSpLocks/>
+          </p:cNvCxnSpPr>
+          <p:nvPr/>
+        </p:nvCxnSpPr>
+        <p:spPr>
+          <a:xfrm flipV="1">
+            <a:off x="2181456" y="1555020"/>
+            <a:ext cx="116987" cy="252341"/>
+          </a:xfrm>
+          <a:prstGeom prst="straightConnector1">
+            <a:avLst/>
+          </a:prstGeom>
+          <a:noFill/>
+          <a:ln w="38100" cap="flat" cmpd="sng" algn="ctr">
+            <a:solidFill>
+              <a:srgbClr val="00B050"/>
+            </a:solidFill>
+            <a:prstDash val="solid"/>
+            <a:round/>
+            <a:headEnd type="none" w="med" len="med"/>
+            <a:tailEnd type="none" w="med" len="med"/>
+          </a:ln>
+          <a:effectLst>
+            <a:outerShdw blurRad="50800" dist="38100" dir="2700000" algn="tl" rotWithShape="0">
+              <a:prstClr val="black">
+                <a:alpha val="40000"/>
+              </a:prstClr>
+            </a:outerShdw>
+          </a:effectLst>
+        </p:spPr>
+      </p:cxnSp>
+      <p:sp>
+        <p:nvSpPr>
+          <p:cNvPr id="142" name="Gleichschenkliges Dreieck 252">
+            <a:extLst>
+              <a:ext uri="{FF2B5EF4-FFF2-40B4-BE49-F238E27FC236}">
+                <a16:creationId xmlns:a16="http://schemas.microsoft.com/office/drawing/2014/main" id="{29E4E807-5A55-4E70-BF21-80D6599CBFF5}"/>
+              </a:ext>
+            </a:extLst>
+          </p:cNvPr>
+          <p:cNvSpPr/>
+          <p:nvPr/>
+        </p:nvSpPr>
+        <p:spPr>
+          <a:xfrm rot="1514955">
+            <a:off x="2253118" y="1482710"/>
+            <a:ext cx="108000" cy="108000"/>
+          </a:xfrm>
+          <a:prstGeom prst="triangle">
+            <a:avLst/>
+          </a:prstGeom>
+          <a:solidFill>
+            <a:srgbClr val="00B050"/>
+          </a:solidFill>
+          <a:ln>
+            <a:noFill/>
+          </a:ln>
+          <a:effectLst>
+            <a:outerShdw blurRad="50800" dist="38100" dir="2700000" algn="tl" rotWithShape="0">
+              <a:prstClr val="black">
+                <a:alpha val="40000"/>
+              </a:prstClr>
+            </a:outerShdw>
+          </a:effectLst>
+        </p:spPr>
+        <p:style>
+          <a:lnRef idx="2">
+            <a:schemeClr val="accent1">
+              <a:shade val="50000"/>
+            </a:schemeClr>
+          </a:lnRef>
+          <a:fillRef idx="1">
+            <a:schemeClr val="accent1"/>
+          </a:fillRef>
+          <a:effectRef idx="0">
+            <a:schemeClr val="accent1"/>
+          </a:effectRef>
+          <a:fontRef idx="minor">
+            <a:schemeClr val="lt1"/>
+          </a:fontRef>
+        </p:style>
+        <p:txBody>
+          <a:bodyPr rtlCol="0" anchor="ctr"/>
+          <a:lstStyle/>
+          <a:p>
+            <a:pPr algn="ctr"/>
+            <a:endParaRPr lang="en-US"/>
+          </a:p>
+        </p:txBody>
+      </p:sp>
+      <p:cxnSp>
+        <p:nvCxnSpPr>
+          <p:cNvPr id="144" name="Gerade Verbindung mit Pfeil 4">
+            <a:extLst>
+              <a:ext uri="{FF2B5EF4-FFF2-40B4-BE49-F238E27FC236}">
+                <a16:creationId xmlns:a16="http://schemas.microsoft.com/office/drawing/2014/main" id="{029B5047-0E4B-4552-A84F-C40E2AE27D02}"/>
+              </a:ext>
+            </a:extLst>
+          </p:cNvPr>
+          <p:cNvCxnSpPr>
+            <a:cxnSpLocks/>
+            <a:stCxn id="84" idx="2"/>
+            <a:endCxn id="135" idx="3"/>
+          </p:cNvCxnSpPr>
+          <p:nvPr/>
+        </p:nvCxnSpPr>
+        <p:spPr>
+          <a:xfrm flipH="1">
+            <a:off x="2500342" y="1003811"/>
+            <a:ext cx="380385" cy="932314"/>
+          </a:xfrm>
+          <a:prstGeom prst="straightConnector1">
+            <a:avLst/>
+          </a:prstGeom>
+          <a:noFill/>
+          <a:ln w="12700" cap="flat" cmpd="sng" algn="ctr">
+            <a:solidFill>
+              <a:srgbClr val="C00000"/>
+            </a:solidFill>
+            <a:prstDash val="solid"/>
+            <a:round/>
+            <a:headEnd type="none" w="med" len="med"/>
+            <a:tailEnd type="none" w="med" len="med"/>
+          </a:ln>
+          <a:effectLst>
+            <a:outerShdw blurRad="50800" dist="38100" dir="2700000" algn="tl" rotWithShape="0">
+              <a:prstClr val="black">
+                <a:alpha val="40000"/>
+              </a:prstClr>
+            </a:outerShdw>
+          </a:effectLst>
+        </p:spPr>
+      </p:cxnSp>
     </p:spTree>
     <p:extLst>
       <p:ext uri="{BB962C8B-B14F-4D97-AF65-F5344CB8AC3E}">
@@ -8235,11 +9040,6 @@
 </file>
 
 <file path=customXml/item1.xml><?xml version="1.0" encoding="utf-8"?>
-<?mso-contentType ?>
-<SharedContentType xmlns="Microsoft.SharePoint.Taxonomy.ContentTypeSync" SourceId="7bc43322-b630-4bac-8b27-31def233d1d0" ContentTypeId="0x0101" PreviousValue="false"/>
-</file>
-
-<file path=customXml/item2.xml><?xml version="1.0" encoding="utf-8"?>
 <ct:contentTypeSchema xmlns:ct="http://schemas.microsoft.com/office/2006/metadata/contentType" xmlns:ma="http://schemas.microsoft.com/office/2006/metadata/properties/metaAttributes" ct:_="" ma:_="" ma:contentTypeName="Dokument" ma:contentTypeID="0x0101000A02AC6D9EF9CA44BE2D7FE53E0F875C" ma:contentTypeVersion="12" ma:contentTypeDescription="Ein neues Dokument erstellen." ma:contentTypeScope="" ma:versionID="6c6d252082fd9ae2dc48941f9a6fd36f">
   <xsd:schema xmlns:xsd="http://www.w3.org/2001/XMLSchema" xmlns:xs="http://www.w3.org/2001/XMLSchema" xmlns:p="http://schemas.microsoft.com/office/2006/metadata/properties" xmlns:ns1="http://schemas.microsoft.com/sharepoint/v3" xmlns:ns2="1a4d292e-883c-434b-96e3-060cfff16c86" xmlns:ns3="aecc70ee-2d6e-4d6b-a98f-0dfc4d2572dc" xmlns:ns4="3f1a0a6d-c532-4d53-8c70-93adc7cbe80c" targetNamespace="http://schemas.microsoft.com/office/2006/metadata/properties" ma:root="true" ma:fieldsID="7789a1f2097b8e592a747d770cd7424d" ns1:_="" ns2:_="" ns3:_="" ns4:_="">
     <xsd:import namespace="http://schemas.microsoft.com/sharepoint/v3"/>
@@ -8502,7 +9302,21 @@
 </ct:contentTypeSchema>
 </file>
 
+<file path=customXml/item2.xml><?xml version="1.0" encoding="utf-8"?>
+<?mso-contentType ?>
+<SharedContentType xmlns="Microsoft.SharePoint.Taxonomy.ContentTypeSync" SourceId="7bc43322-b630-4bac-8b27-31def233d1d0" ContentTypeId="0x0101" PreviousValue="false"/>
+</file>
+
 <file path=customXml/item3.xml><?xml version="1.0" encoding="utf-8"?>
+<?mso-contentType ?>
+<FormTemplates xmlns="http://schemas.microsoft.com/sharepoint/v3/contenttype/forms">
+  <Display>DocumentLibraryForm</Display>
+  <Edit>DocumentLibraryForm</Edit>
+  <New>DocumentLibraryForm</New>
+</FormTemplates>
+</file>
+
+<file path=customXml/item4.xml><?xml version="1.0" encoding="utf-8"?>
 <p:properties xmlns:p="http://schemas.microsoft.com/office/2006/metadata/properties" xmlns:xsi="http://www.w3.org/2001/XMLSchema-instance" xmlns:pc="http://schemas.microsoft.com/office/infopath/2007/PartnerControls">
   <documentManagement>
     <TaxCatchAll xmlns="1a4d292e-883c-434b-96e3-060cfff16c86"/>
@@ -8513,24 +9327,7 @@
 </p:properties>
 </file>
 
-<file path=customXml/item4.xml><?xml version="1.0" encoding="utf-8"?>
-<?mso-contentType ?>
-<FormTemplates xmlns="http://schemas.microsoft.com/sharepoint/v3/contenttype/forms">
-  <Display>DocumentLibraryForm</Display>
-  <Edit>DocumentLibraryForm</Edit>
-  <New>DocumentLibraryForm</New>
-</FormTemplates>
-</file>
-
 <file path=customXml/itemProps1.xml><?xml version="1.0" encoding="utf-8"?>
-<ds:datastoreItem xmlns:ds="http://schemas.openxmlformats.org/officeDocument/2006/customXml" ds:itemID="{E2E7F328-0877-4E3B-89D4-88D98111FCAF}">
-  <ds:schemaRefs>
-    <ds:schemaRef ds:uri="Microsoft.SharePoint.Taxonomy.ContentTypeSync"/>
-  </ds:schemaRefs>
-</ds:datastoreItem>
-</file>
-
-<file path=customXml/itemProps2.xml><?xml version="1.0" encoding="utf-8"?>
 <ds:datastoreItem xmlns:ds="http://schemas.openxmlformats.org/officeDocument/2006/customXml" ds:itemID="{3AFBB2A2-6AEA-44D3-9E19-77C2996646D1}">
   <ds:schemaRefs>
     <ds:schemaRef ds:uri="http://schemas.microsoft.com/office/2006/metadata/contentType"/>
@@ -8551,7 +9348,23 @@
 </ds:datastoreItem>
 </file>
 
+<file path=customXml/itemProps2.xml><?xml version="1.0" encoding="utf-8"?>
+<ds:datastoreItem xmlns:ds="http://schemas.openxmlformats.org/officeDocument/2006/customXml" ds:itemID="{E2E7F328-0877-4E3B-89D4-88D98111FCAF}">
+  <ds:schemaRefs>
+    <ds:schemaRef ds:uri="Microsoft.SharePoint.Taxonomy.ContentTypeSync"/>
+  </ds:schemaRefs>
+</ds:datastoreItem>
+</file>
+
 <file path=customXml/itemProps3.xml><?xml version="1.0" encoding="utf-8"?>
+<ds:datastoreItem xmlns:ds="http://schemas.openxmlformats.org/officeDocument/2006/customXml" ds:itemID="{04D729A8-6F7F-45FE-91C8-CB5671C0CFA0}">
+  <ds:schemaRefs>
+    <ds:schemaRef ds:uri="http://schemas.microsoft.com/sharepoint/v3/contenttype/forms"/>
+  </ds:schemaRefs>
+</ds:datastoreItem>
+</file>
+
+<file path=customXml/itemProps4.xml><?xml version="1.0" encoding="utf-8"?>
 <ds:datastoreItem xmlns:ds="http://schemas.openxmlformats.org/officeDocument/2006/customXml" ds:itemID="{0ACF9CDC-7187-4C27-99A4-44DD755F7818}">
   <ds:schemaRefs>
     <ds:schemaRef ds:uri="http://schemas.microsoft.com/office/2006/metadata/properties"/>
@@ -8560,12 +9373,4 @@
     <ds:schemaRef ds:uri="http://schemas.microsoft.com/sharepoint/v3"/>
   </ds:schemaRefs>
 </ds:datastoreItem>
-</file>
-
-<file path=customXml/itemProps4.xml><?xml version="1.0" encoding="utf-8"?>
-<ds:datastoreItem xmlns:ds="http://schemas.openxmlformats.org/officeDocument/2006/customXml" ds:itemID="{04D729A8-6F7F-45FE-91C8-CB5671C0CFA0}">
-  <ds:schemaRefs>
-    <ds:schemaRef ds:uri="http://schemas.microsoft.com/sharepoint/v3/contenttype/forms"/>
-  </ds:schemaRefs>
-</ds:datastoreItem>
 </file>
</xml_diff>

<commit_message>
Adds carbamazepine to DDI network
</commit_message>
<xml_diff>
--- a/Qualification/Input/Content/images/DDI_CYP3A4_Compound_Network.pptx
+++ b/Qualification/Input/Content/images/DDI_CYP3A4_Compound_Network.pptx
@@ -1321,6 +1321,38 @@
       </pc:sldChg>
     </pc:docChg>
   </pc:docChgLst>
+  <pc:docChgLst>
+    <pc:chgData name="Andre Dallmann" userId="5c23077c-d33a-43b1-8da1-43baabc21ac0" providerId="ADAL" clId="{997083EC-9734-4558-B9F9-E174E0C75D60}"/>
+    <pc:docChg chg="modSld">
+      <pc:chgData name="Andre Dallmann" userId="5c23077c-d33a-43b1-8da1-43baabc21ac0" providerId="ADAL" clId="{997083EC-9734-4558-B9F9-E174E0C75D60}" dt="2022-05-23T08:29:58.333" v="1" actId="1038"/>
+      <pc:docMkLst>
+        <pc:docMk/>
+      </pc:docMkLst>
+      <pc:sldChg chg="modSp mod">
+        <pc:chgData name="Andre Dallmann" userId="5c23077c-d33a-43b1-8da1-43baabc21ac0" providerId="ADAL" clId="{997083EC-9734-4558-B9F9-E174E0C75D60}" dt="2022-05-23T08:29:58.333" v="1" actId="1038"/>
+        <pc:sldMkLst>
+          <pc:docMk/>
+          <pc:sldMk cId="2088911489" sldId="257"/>
+        </pc:sldMkLst>
+        <pc:spChg chg="mod">
+          <ac:chgData name="Andre Dallmann" userId="5c23077c-d33a-43b1-8da1-43baabc21ac0" providerId="ADAL" clId="{997083EC-9734-4558-B9F9-E174E0C75D60}" dt="2022-05-23T08:29:58.333" v="1" actId="1038"/>
+          <ac:spMkLst>
+            <pc:docMk/>
+            <pc:sldMk cId="2088911489" sldId="257"/>
+            <ac:spMk id="142" creationId="{29E4E807-5A55-4E70-BF21-80D6599CBFF5}"/>
+          </ac:spMkLst>
+        </pc:spChg>
+        <pc:cxnChg chg="mod">
+          <ac:chgData name="Andre Dallmann" userId="5c23077c-d33a-43b1-8da1-43baabc21ac0" providerId="ADAL" clId="{997083EC-9734-4558-B9F9-E174E0C75D60}" dt="2022-05-23T08:29:58.333" v="1" actId="1038"/>
+          <ac:cxnSpMkLst>
+            <pc:docMk/>
+            <pc:sldMk cId="2088911489" sldId="257"/>
+            <ac:cxnSpMk id="141" creationId="{D756DE5F-91B3-4242-AC21-1F6296FE0CE4}"/>
+          </ac:cxnSpMkLst>
+        </pc:cxnChg>
+      </pc:sldChg>
+    </pc:docChg>
+  </pc:docChgLst>
 </pc:chgInfo>
 </file>
 
@@ -1455,7 +1487,7 @@
           <a:p>
             <a:fld id="{3A25AF7A-D1F1-44F6-9E50-C79D58050BA4}" type="datetimeFigureOut">
               <a:rPr lang="en-US" smtClean="0"/>
-              <a:t>4/27/2022</a:t>
+              <a:t>5/23/2022</a:t>
             </a:fld>
             <a:endParaRPr lang="en-US" dirty="0"/>
           </a:p>
@@ -1625,7 +1657,7 @@
           <a:p>
             <a:fld id="{3A25AF7A-D1F1-44F6-9E50-C79D58050BA4}" type="datetimeFigureOut">
               <a:rPr lang="en-US" smtClean="0"/>
-              <a:t>4/27/2022</a:t>
+              <a:t>5/23/2022</a:t>
             </a:fld>
             <a:endParaRPr lang="en-US" dirty="0"/>
           </a:p>
@@ -1805,7 +1837,7 @@
           <a:p>
             <a:fld id="{3A25AF7A-D1F1-44F6-9E50-C79D58050BA4}" type="datetimeFigureOut">
               <a:rPr lang="en-US" smtClean="0"/>
-              <a:t>4/27/2022</a:t>
+              <a:t>5/23/2022</a:t>
             </a:fld>
             <a:endParaRPr lang="en-US" dirty="0"/>
           </a:p>
@@ -1975,7 +2007,7 @@
           <a:p>
             <a:fld id="{3A25AF7A-D1F1-44F6-9E50-C79D58050BA4}" type="datetimeFigureOut">
               <a:rPr lang="en-US" smtClean="0"/>
-              <a:t>4/27/2022</a:t>
+              <a:t>5/23/2022</a:t>
             </a:fld>
             <a:endParaRPr lang="en-US" dirty="0"/>
           </a:p>
@@ -2221,7 +2253,7 @@
           <a:p>
             <a:fld id="{3A25AF7A-D1F1-44F6-9E50-C79D58050BA4}" type="datetimeFigureOut">
               <a:rPr lang="en-US" smtClean="0"/>
-              <a:t>4/27/2022</a:t>
+              <a:t>5/23/2022</a:t>
             </a:fld>
             <a:endParaRPr lang="en-US" dirty="0"/>
           </a:p>
@@ -2453,7 +2485,7 @@
           <a:p>
             <a:fld id="{3A25AF7A-D1F1-44F6-9E50-C79D58050BA4}" type="datetimeFigureOut">
               <a:rPr lang="en-US" smtClean="0"/>
-              <a:t>4/27/2022</a:t>
+              <a:t>5/23/2022</a:t>
             </a:fld>
             <a:endParaRPr lang="en-US" dirty="0"/>
           </a:p>
@@ -2820,7 +2852,7 @@
           <a:p>
             <a:fld id="{3A25AF7A-D1F1-44F6-9E50-C79D58050BA4}" type="datetimeFigureOut">
               <a:rPr lang="en-US" smtClean="0"/>
-              <a:t>4/27/2022</a:t>
+              <a:t>5/23/2022</a:t>
             </a:fld>
             <a:endParaRPr lang="en-US" dirty="0"/>
           </a:p>
@@ -2938,7 +2970,7 @@
           <a:p>
             <a:fld id="{3A25AF7A-D1F1-44F6-9E50-C79D58050BA4}" type="datetimeFigureOut">
               <a:rPr lang="en-US" smtClean="0"/>
-              <a:t>4/27/2022</a:t>
+              <a:t>5/23/2022</a:t>
             </a:fld>
             <a:endParaRPr lang="en-US" dirty="0"/>
           </a:p>
@@ -3033,7 +3065,7 @@
           <a:p>
             <a:fld id="{3A25AF7A-D1F1-44F6-9E50-C79D58050BA4}" type="datetimeFigureOut">
               <a:rPr lang="en-US" smtClean="0"/>
-              <a:t>4/27/2022</a:t>
+              <a:t>5/23/2022</a:t>
             </a:fld>
             <a:endParaRPr lang="en-US" dirty="0"/>
           </a:p>
@@ -3310,7 +3342,7 @@
           <a:p>
             <a:fld id="{3A25AF7A-D1F1-44F6-9E50-C79D58050BA4}" type="datetimeFigureOut">
               <a:rPr lang="en-US" smtClean="0"/>
-              <a:t>4/27/2022</a:t>
+              <a:t>5/23/2022</a:t>
             </a:fld>
             <a:endParaRPr lang="en-US" dirty="0"/>
           </a:p>
@@ -3567,7 +3599,7 @@
           <a:p>
             <a:fld id="{3A25AF7A-D1F1-44F6-9E50-C79D58050BA4}" type="datetimeFigureOut">
               <a:rPr lang="en-US" smtClean="0"/>
-              <a:t>4/27/2022</a:t>
+              <a:t>5/23/2022</a:t>
             </a:fld>
             <a:endParaRPr lang="en-US" dirty="0"/>
           </a:p>
@@ -3780,7 +3812,7 @@
           <a:p>
             <a:fld id="{3A25AF7A-D1F1-44F6-9E50-C79D58050BA4}" type="datetimeFigureOut">
               <a:rPr lang="en-US" smtClean="0"/>
-              <a:t>4/27/2022</a:t>
+              <a:t>5/23/2022</a:t>
             </a:fld>
             <a:endParaRPr lang="en-US" dirty="0"/>
           </a:p>
@@ -8638,7 +8670,7 @@
         </p:nvCxnSpPr>
         <p:spPr>
           <a:xfrm flipV="1">
-            <a:off x="2181456" y="1555020"/>
+            <a:off x="2186218" y="1555020"/>
             <a:ext cx="116987" cy="252341"/>
           </a:xfrm>
           <a:prstGeom prst="straightConnector1">
@@ -8677,7 +8709,7 @@
         </p:nvSpPr>
         <p:spPr>
           <a:xfrm rot="1514955">
-            <a:off x="2253118" y="1482710"/>
+            <a:off x="2257880" y="1482710"/>
             <a:ext cx="108000" cy="108000"/>
           </a:xfrm>
           <a:prstGeom prst="triangle">
@@ -9303,8 +9335,14 @@
 </file>
 
 <file path=customXml/item2.xml><?xml version="1.0" encoding="utf-8"?>
-<?mso-contentType ?>
-<SharedContentType xmlns="Microsoft.SharePoint.Taxonomy.ContentTypeSync" SourceId="7bc43322-b630-4bac-8b27-31def233d1d0" ContentTypeId="0x0101" PreviousValue="false"/>
+<p:properties xmlns:p="http://schemas.microsoft.com/office/2006/metadata/properties" xmlns:xsi="http://www.w3.org/2001/XMLSchema-instance" xmlns:pc="http://schemas.microsoft.com/office/infopath/2007/PartnerControls">
+  <documentManagement>
+    <TaxCatchAll xmlns="1a4d292e-883c-434b-96e3-060cfff16c86"/>
+    <_dlc_ExpireDateSaved xmlns="http://schemas.microsoft.com/sharepoint/v3" xsi:nil="true"/>
+    <_dlc_ExpireDate xmlns="http://schemas.microsoft.com/sharepoint/v3" xsi:nil="true"/>
+    <_dlc_Exempt xmlns="http://schemas.microsoft.com/sharepoint/v3" xsi:nil="true"/>
+  </documentManagement>
+</p:properties>
 </file>
 
 <file path=customXml/item3.xml><?xml version="1.0" encoding="utf-8"?>
@@ -9317,14 +9355,8 @@
 </file>
 
 <file path=customXml/item4.xml><?xml version="1.0" encoding="utf-8"?>
-<p:properties xmlns:p="http://schemas.microsoft.com/office/2006/metadata/properties" xmlns:xsi="http://www.w3.org/2001/XMLSchema-instance" xmlns:pc="http://schemas.microsoft.com/office/infopath/2007/PartnerControls">
-  <documentManagement>
-    <TaxCatchAll xmlns="1a4d292e-883c-434b-96e3-060cfff16c86"/>
-    <_dlc_ExpireDateSaved xmlns="http://schemas.microsoft.com/sharepoint/v3" xsi:nil="true"/>
-    <_dlc_ExpireDate xmlns="http://schemas.microsoft.com/sharepoint/v3" xsi:nil="true"/>
-    <_dlc_Exempt xmlns="http://schemas.microsoft.com/sharepoint/v3" xsi:nil="true"/>
-  </documentManagement>
-</p:properties>
+<?mso-contentType ?>
+<SharedContentType xmlns="Microsoft.SharePoint.Taxonomy.ContentTypeSync" SourceId="7bc43322-b630-4bac-8b27-31def233d1d0" ContentTypeId="0x0101" PreviousValue="false"/>
 </file>
 
 <file path=customXml/itemProps1.xml><?xml version="1.0" encoding="utf-8"?>
@@ -9349,9 +9381,12 @@
 </file>
 
 <file path=customXml/itemProps2.xml><?xml version="1.0" encoding="utf-8"?>
-<ds:datastoreItem xmlns:ds="http://schemas.openxmlformats.org/officeDocument/2006/customXml" ds:itemID="{E2E7F328-0877-4E3B-89D4-88D98111FCAF}">
+<ds:datastoreItem xmlns:ds="http://schemas.openxmlformats.org/officeDocument/2006/customXml" ds:itemID="{0ACF9CDC-7187-4C27-99A4-44DD755F7818}">
   <ds:schemaRefs>
-    <ds:schemaRef ds:uri="Microsoft.SharePoint.Taxonomy.ContentTypeSync"/>
+    <ds:schemaRef ds:uri="http://schemas.microsoft.com/office/2006/metadata/properties"/>
+    <ds:schemaRef ds:uri="http://schemas.microsoft.com/office/infopath/2007/PartnerControls"/>
+    <ds:schemaRef ds:uri="1a4d292e-883c-434b-96e3-060cfff16c86"/>
+    <ds:schemaRef ds:uri="http://schemas.microsoft.com/sharepoint/v3"/>
   </ds:schemaRefs>
 </ds:datastoreItem>
 </file>
@@ -9365,12 +9400,9 @@
 </file>
 
 <file path=customXml/itemProps4.xml><?xml version="1.0" encoding="utf-8"?>
-<ds:datastoreItem xmlns:ds="http://schemas.openxmlformats.org/officeDocument/2006/customXml" ds:itemID="{0ACF9CDC-7187-4C27-99A4-44DD755F7818}">
+<ds:datastoreItem xmlns:ds="http://schemas.openxmlformats.org/officeDocument/2006/customXml" ds:itemID="{E2E7F328-0877-4E3B-89D4-88D98111FCAF}">
   <ds:schemaRefs>
-    <ds:schemaRef ds:uri="http://schemas.microsoft.com/office/2006/metadata/properties"/>
-    <ds:schemaRef ds:uri="http://schemas.microsoft.com/office/infopath/2007/PartnerControls"/>
-    <ds:schemaRef ds:uri="1a4d292e-883c-434b-96e3-060cfff16c86"/>
-    <ds:schemaRef ds:uri="http://schemas.microsoft.com/sharepoint/v3"/>
+    <ds:schemaRef ds:uri="Microsoft.SharePoint.Taxonomy.ContentTypeSync"/>
   </ds:schemaRefs>
 </ds:datastoreItem>
 </file>
</xml_diff>